<commit_message>
criada animações no ppt 4 primeiros slides
</commit_message>
<xml_diff>
--- a/Trabalho_Pratico/Powerpoint Apresentacao Final.pptx
+++ b/Trabalho_Pratico/Powerpoint Apresentacao Final.pptx
@@ -205,7 +205,7 @@
           <a:p>
             <a:fld id="{A437986F-AC6D-4C3A-90A1-3E6B0B99CC93}" type="datetimeFigureOut">
               <a:rPr lang="pt-PT" smtClean="0"/>
-              <a:t>27/05/2024</a:t>
+              <a:t>28/05/2024</a:t>
             </a:fld>
             <a:endParaRPr lang="pt-PT"/>
           </a:p>
@@ -698,7 +698,7 @@
           <a:p>
             <a:fld id="{BE777EAB-2576-4CDE-84EE-E2727C566DC3}" type="datetime1">
               <a:rPr lang="pt-PT" smtClean="0"/>
-              <a:t>27/05/2024</a:t>
+              <a:t>28/05/2024</a:t>
             </a:fld>
             <a:endParaRPr lang="pt-PT"/>
           </a:p>
@@ -909,7 +909,7 @@
           <a:p>
             <a:fld id="{5BF5A989-D276-4A93-806E-0B349C0E4B8D}" type="datetime1">
               <a:rPr lang="pt-PT" smtClean="0"/>
-              <a:t>27/05/2024</a:t>
+              <a:t>28/05/2024</a:t>
             </a:fld>
             <a:endParaRPr lang="pt-PT"/>
           </a:p>
@@ -1168,7 +1168,7 @@
           <a:p>
             <a:fld id="{564D2907-45C8-4D7C-9F92-0E6D0DBDC12B}" type="datetime1">
               <a:rPr lang="pt-PT" smtClean="0"/>
-              <a:t>27/05/2024</a:t>
+              <a:t>28/05/2024</a:t>
             </a:fld>
             <a:endParaRPr lang="pt-PT"/>
           </a:p>
@@ -1341,7 +1341,7 @@
           <a:p>
             <a:fld id="{8C3DF853-3165-4917-82EB-D255249AE443}" type="datetime1">
               <a:rPr lang="pt-PT" smtClean="0"/>
-              <a:t>27/05/2024</a:t>
+              <a:t>28/05/2024</a:t>
             </a:fld>
             <a:endParaRPr lang="pt-PT"/>
           </a:p>
@@ -1687,7 +1687,7 @@
           <a:p>
             <a:fld id="{4FFF4930-C8A5-4C44-8FFB-7A68FE2E1AD8}" type="datetime1">
               <a:rPr lang="pt-PT" smtClean="0"/>
-              <a:t>27/05/2024</a:t>
+              <a:t>28/05/2024</a:t>
             </a:fld>
             <a:endParaRPr lang="pt-PT"/>
           </a:p>
@@ -1965,7 +1965,7 @@
           <a:p>
             <a:fld id="{E8F40E13-3AC7-421E-8479-8D1CA3B55ADE}" type="datetime1">
               <a:rPr lang="pt-PT" smtClean="0"/>
-              <a:t>27/05/2024</a:t>
+              <a:t>28/05/2024</a:t>
             </a:fld>
             <a:endParaRPr lang="pt-PT"/>
           </a:p>
@@ -2347,7 +2347,7 @@
           <a:p>
             <a:fld id="{C860E7C0-D246-4000-A91B-B08807C4E7F7}" type="datetime1">
               <a:rPr lang="pt-PT" smtClean="0"/>
-              <a:t>27/05/2024</a:t>
+              <a:t>28/05/2024</a:t>
             </a:fld>
             <a:endParaRPr lang="pt-PT"/>
           </a:p>
@@ -2468,7 +2468,7 @@
           <a:p>
             <a:fld id="{8BBC05E6-922B-4F5E-A485-DCDFF9CD7413}" type="datetime1">
               <a:rPr lang="pt-PT" smtClean="0"/>
-              <a:t>27/05/2024</a:t>
+              <a:t>28/05/2024</a:t>
             </a:fld>
             <a:endParaRPr lang="pt-PT"/>
           </a:p>
@@ -2642,7 +2642,7 @@
           <a:p>
             <a:fld id="{97BC448C-2D1D-4F85-B170-1458B80F525B}" type="datetime1">
               <a:rPr lang="pt-PT" smtClean="0"/>
-              <a:t>27/05/2024</a:t>
+              <a:t>28/05/2024</a:t>
             </a:fld>
             <a:endParaRPr lang="pt-PT"/>
           </a:p>
@@ -2999,7 +2999,7 @@
           <a:p>
             <a:fld id="{F63AEBE6-26DF-4269-B12B-E41CD7FE1DA5}" type="datetime1">
               <a:rPr lang="pt-PT" smtClean="0"/>
-              <a:t>27/05/2024</a:t>
+              <a:t>28/05/2024</a:t>
             </a:fld>
             <a:endParaRPr lang="pt-PT"/>
           </a:p>
@@ -3379,7 +3379,7 @@
           <a:p>
             <a:fld id="{974D6D17-95F9-4242-AAB8-A263A962B2C6}" type="datetime1">
               <a:rPr lang="pt-PT" smtClean="0"/>
-              <a:t>27/05/2024</a:t>
+              <a:t>28/05/2024</a:t>
             </a:fld>
             <a:endParaRPr lang="pt-PT"/>
           </a:p>
@@ -3669,7 +3669,7 @@
           <a:p>
             <a:fld id="{62562986-1855-4ECD-A567-C5197286FEC5}" type="datetime1">
               <a:rPr lang="pt-PT" smtClean="0"/>
-              <a:t>27/05/2024</a:t>
+              <a:t>28/05/2024</a:t>
             </a:fld>
             <a:endParaRPr lang="pt-PT"/>
           </a:p>
@@ -4607,7 +4607,7 @@
         <p:spPr>
           <a:xfrm>
             <a:off x="1097280" y="1818226"/>
-            <a:ext cx="10515600" cy="4351338"/>
+            <a:ext cx="10515600" cy="836197"/>
           </a:xfrm>
         </p:spPr>
         <p:txBody>
@@ -4638,282 +4638,6 @@
               </a:rPr>
               <a:t>Data Interpretation</a:t>
             </a:r>
-          </a:p>
-          <a:p>
-            <a:pPr marL="205740" indent="-228600">
-              <a:buFont typeface="Calibri" panose="020F0502020204030204" pitchFamily="34" charset="0"/>
-              <a:buChar char="•"/>
-            </a:pPr>
-            <a:r>
-              <a:rPr lang="pt-PT" dirty="0" err="1">
-                <a:latin typeface="Helvetica" panose="020B0604020202020204" pitchFamily="34" charset="0"/>
-                <a:cs typeface="Helvetica" panose="020B0604020202020204" pitchFamily="34" charset="0"/>
-              </a:rPr>
-              <a:t>Dataset</a:t>
-            </a:r>
-            <a:r>
-              <a:rPr lang="pt-PT" dirty="0">
-                <a:latin typeface="Helvetica" panose="020B0604020202020204" pitchFamily="34" charset="0"/>
-                <a:cs typeface="Helvetica" panose="020B0604020202020204" pitchFamily="34" charset="0"/>
-              </a:rPr>
-              <a:t> </a:t>
-            </a:r>
-            <a:r>
-              <a:rPr lang="pt-PT" dirty="0" err="1">
-                <a:latin typeface="Helvetica" panose="020B0604020202020204" pitchFamily="34" charset="0"/>
-                <a:cs typeface="Helvetica" panose="020B0604020202020204" pitchFamily="34" charset="0"/>
-              </a:rPr>
-              <a:t>Characterization</a:t>
-            </a:r>
-            <a:r>
-              <a:rPr lang="pt-PT" dirty="0">
-                <a:latin typeface="Helvetica" panose="020B0604020202020204" pitchFamily="34" charset="0"/>
-                <a:cs typeface="Helvetica" panose="020B0604020202020204" pitchFamily="34" charset="0"/>
-              </a:rPr>
-              <a:t> </a:t>
-            </a:r>
-            <a:r>
-              <a:rPr lang="pt-PT" dirty="0" err="1">
-                <a:latin typeface="Helvetica" panose="020B0604020202020204" pitchFamily="34" charset="0"/>
-                <a:cs typeface="Helvetica" panose="020B0604020202020204" pitchFamily="34" charset="0"/>
-              </a:rPr>
-              <a:t>and</a:t>
-            </a:r>
-            <a:r>
-              <a:rPr lang="pt-PT" dirty="0">
-                <a:latin typeface="Helvetica" panose="020B0604020202020204" pitchFamily="34" charset="0"/>
-                <a:cs typeface="Helvetica" panose="020B0604020202020204" pitchFamily="34" charset="0"/>
-              </a:rPr>
-              <a:t> </a:t>
-            </a:r>
-            <a:r>
-              <a:rPr lang="pt-PT" dirty="0" err="1">
-                <a:latin typeface="Helvetica" panose="020B0604020202020204" pitchFamily="34" charset="0"/>
-                <a:cs typeface="Helvetica" panose="020B0604020202020204" pitchFamily="34" charset="0"/>
-              </a:rPr>
-              <a:t>Preprocessing</a:t>
-            </a:r>
-            <a:endParaRPr lang="pt-PT" dirty="0">
-              <a:latin typeface="Helvetica" panose="020B0604020202020204" pitchFamily="34" charset="0"/>
-              <a:cs typeface="Helvetica" panose="020B0604020202020204" pitchFamily="34" charset="0"/>
-            </a:endParaRPr>
-          </a:p>
-          <a:p>
-            <a:pPr marL="441198" lvl="1" indent="-228600">
-              <a:buFont typeface="Calibri" panose="020F0502020204030204" pitchFamily="34" charset="0"/>
-              <a:buChar char="•"/>
-            </a:pPr>
-            <a:r>
-              <a:rPr lang="pt-PT" sz="2000" dirty="0">
-                <a:latin typeface="Helvetica" panose="020B0604020202020204" pitchFamily="34" charset="0"/>
-                <a:cs typeface="Helvetica" panose="020B0604020202020204" pitchFamily="34" charset="0"/>
-              </a:rPr>
-              <a:t>Data </a:t>
-            </a:r>
-            <a:r>
-              <a:rPr lang="pt-PT" sz="2000" dirty="0" err="1">
-                <a:latin typeface="Helvetica" panose="020B0604020202020204" pitchFamily="34" charset="0"/>
-                <a:cs typeface="Helvetica" panose="020B0604020202020204" pitchFamily="34" charset="0"/>
-              </a:rPr>
-              <a:t>Imputation</a:t>
-            </a:r>
-            <a:r>
-              <a:rPr lang="pt-PT" sz="2000" dirty="0">
-                <a:latin typeface="Helvetica" panose="020B0604020202020204" pitchFamily="34" charset="0"/>
-                <a:cs typeface="Helvetica" panose="020B0604020202020204" pitchFamily="34" charset="0"/>
-              </a:rPr>
-              <a:t> </a:t>
-            </a:r>
-            <a:r>
-              <a:rPr lang="pt-PT" sz="2000" dirty="0" err="1">
-                <a:latin typeface="Helvetica" panose="020B0604020202020204" pitchFamily="34" charset="0"/>
-                <a:cs typeface="Helvetica" panose="020B0604020202020204" pitchFamily="34" charset="0"/>
-              </a:rPr>
-              <a:t>and</a:t>
-            </a:r>
-            <a:r>
-              <a:rPr lang="pt-PT" sz="2000" dirty="0">
-                <a:latin typeface="Helvetica" panose="020B0604020202020204" pitchFamily="34" charset="0"/>
-                <a:cs typeface="Helvetica" panose="020B0604020202020204" pitchFamily="34" charset="0"/>
-              </a:rPr>
-              <a:t> </a:t>
-            </a:r>
-            <a:r>
-              <a:rPr lang="pt-PT" sz="2000" dirty="0" err="1">
-                <a:latin typeface="Helvetica" panose="020B0604020202020204" pitchFamily="34" charset="0"/>
-                <a:cs typeface="Helvetica" panose="020B0604020202020204" pitchFamily="34" charset="0"/>
-              </a:rPr>
-              <a:t>dimensionality</a:t>
-            </a:r>
-            <a:r>
-              <a:rPr lang="pt-PT" sz="2000" dirty="0">
-                <a:latin typeface="Helvetica" panose="020B0604020202020204" pitchFamily="34" charset="0"/>
-                <a:cs typeface="Helvetica" panose="020B0604020202020204" pitchFamily="34" charset="0"/>
-              </a:rPr>
-              <a:t> </a:t>
-            </a:r>
-            <a:r>
-              <a:rPr lang="pt-PT" sz="2000" dirty="0" err="1">
-                <a:latin typeface="Helvetica" panose="020B0604020202020204" pitchFamily="34" charset="0"/>
-                <a:cs typeface="Helvetica" panose="020B0604020202020204" pitchFamily="34" charset="0"/>
-              </a:rPr>
-              <a:t>reduction</a:t>
-            </a:r>
-            <a:endParaRPr lang="pt-PT" sz="2000" dirty="0">
-              <a:latin typeface="Helvetica" panose="020B0604020202020204" pitchFamily="34" charset="0"/>
-              <a:cs typeface="Helvetica" panose="020B0604020202020204" pitchFamily="34" charset="0"/>
-            </a:endParaRPr>
-          </a:p>
-          <a:p>
-            <a:pPr marL="441198" lvl="1" indent="-228600">
-              <a:buFont typeface="Calibri" panose="020F0502020204030204" pitchFamily="34" charset="0"/>
-              <a:buChar char="•"/>
-            </a:pPr>
-            <a:r>
-              <a:rPr lang="pt-PT" sz="2000" dirty="0" err="1">
-                <a:latin typeface="Helvetica" panose="020B0604020202020204" pitchFamily="34" charset="0"/>
-                <a:cs typeface="Helvetica" panose="020B0604020202020204" pitchFamily="34" charset="0"/>
-              </a:rPr>
-              <a:t>Questioning</a:t>
-            </a:r>
-            <a:endParaRPr lang="pt-PT" sz="2000" dirty="0">
-              <a:latin typeface="Helvetica" panose="020B0604020202020204" pitchFamily="34" charset="0"/>
-              <a:cs typeface="Helvetica" panose="020B0604020202020204" pitchFamily="34" charset="0"/>
-            </a:endParaRPr>
-          </a:p>
-          <a:p>
-            <a:pPr marL="205740" indent="-228600">
-              <a:buFont typeface="Calibri" panose="020F0502020204030204" pitchFamily="34" charset="0"/>
-              <a:buChar char="•"/>
-            </a:pPr>
-            <a:r>
-              <a:rPr lang="en-US" dirty="0">
-                <a:latin typeface="Helvetica" panose="020B0604020202020204" pitchFamily="34" charset="0"/>
-                <a:cs typeface="Helvetica" panose="020B0604020202020204" pitchFamily="34" charset="0"/>
-              </a:rPr>
-              <a:t>Application of Models and Performance Assessment</a:t>
-            </a:r>
-          </a:p>
-          <a:p>
-            <a:pPr marL="441198" lvl="1" indent="-228600">
-              <a:buFont typeface="Calibri" panose="020F0502020204030204" pitchFamily="34" charset="0"/>
-              <a:buChar char="•"/>
-            </a:pPr>
-            <a:r>
-              <a:rPr lang="pt-PT" sz="2000" dirty="0" err="1">
-                <a:latin typeface="Helvetica" panose="020B0604020202020204" pitchFamily="34" charset="0"/>
-                <a:cs typeface="Helvetica" panose="020B0604020202020204" pitchFamily="34" charset="0"/>
-              </a:rPr>
-              <a:t>Model</a:t>
-            </a:r>
-            <a:r>
-              <a:rPr lang="pt-PT" sz="2000" dirty="0">
-                <a:latin typeface="Helvetica" panose="020B0604020202020204" pitchFamily="34" charset="0"/>
-                <a:cs typeface="Helvetica" panose="020B0604020202020204" pitchFamily="34" charset="0"/>
-              </a:rPr>
-              <a:t> </a:t>
-            </a:r>
-            <a:r>
-              <a:rPr lang="pt-PT" sz="2000" dirty="0" err="1">
-                <a:latin typeface="Helvetica" panose="020B0604020202020204" pitchFamily="34" charset="0"/>
-                <a:cs typeface="Helvetica" panose="020B0604020202020204" pitchFamily="34" charset="0"/>
-              </a:rPr>
-              <a:t>comparison</a:t>
-            </a:r>
-            <a:endParaRPr lang="pt-PT" sz="2000" dirty="0">
-              <a:latin typeface="Helvetica" panose="020B0604020202020204" pitchFamily="34" charset="0"/>
-              <a:cs typeface="Helvetica" panose="020B0604020202020204" pitchFamily="34" charset="0"/>
-            </a:endParaRPr>
-          </a:p>
-          <a:p>
-            <a:pPr marL="441198" lvl="1" indent="-228600">
-              <a:buFont typeface="Calibri" panose="020F0502020204030204" pitchFamily="34" charset="0"/>
-              <a:buChar char="•"/>
-            </a:pPr>
-            <a:r>
-              <a:rPr lang="pt-PT" sz="2000" dirty="0" err="1">
-                <a:latin typeface="Helvetica" panose="020B0604020202020204" pitchFamily="34" charset="0"/>
-                <a:cs typeface="Helvetica" panose="020B0604020202020204" pitchFamily="34" charset="0"/>
-              </a:rPr>
-              <a:t>Sampling</a:t>
-            </a:r>
-            <a:r>
-              <a:rPr lang="pt-PT" sz="2000" dirty="0">
-                <a:latin typeface="Helvetica" panose="020B0604020202020204" pitchFamily="34" charset="0"/>
-                <a:cs typeface="Helvetica" panose="020B0604020202020204" pitchFamily="34" charset="0"/>
-              </a:rPr>
-              <a:t> </a:t>
-            </a:r>
-            <a:r>
-              <a:rPr lang="pt-PT" sz="2000" dirty="0" err="1">
-                <a:latin typeface="Helvetica" panose="020B0604020202020204" pitchFamily="34" charset="0"/>
-                <a:cs typeface="Helvetica" panose="020B0604020202020204" pitchFamily="34" charset="0"/>
-              </a:rPr>
-              <a:t>methods</a:t>
-            </a:r>
-            <a:r>
-              <a:rPr lang="pt-PT" sz="2000" dirty="0">
-                <a:latin typeface="Helvetica" panose="020B0604020202020204" pitchFamily="34" charset="0"/>
-                <a:cs typeface="Helvetica" panose="020B0604020202020204" pitchFamily="34" charset="0"/>
-              </a:rPr>
-              <a:t> </a:t>
-            </a:r>
-            <a:r>
-              <a:rPr lang="pt-PT" sz="2000" dirty="0" err="1">
-                <a:latin typeface="Helvetica" panose="020B0604020202020204" pitchFamily="34" charset="0"/>
-                <a:cs typeface="Helvetica" panose="020B0604020202020204" pitchFamily="34" charset="0"/>
-              </a:rPr>
-              <a:t>comparison</a:t>
-            </a:r>
-            <a:endParaRPr lang="pt-PT" sz="2000" dirty="0">
-              <a:latin typeface="Helvetica" panose="020B0604020202020204" pitchFamily="34" charset="0"/>
-              <a:cs typeface="Helvetica" panose="020B0604020202020204" pitchFamily="34" charset="0"/>
-            </a:endParaRPr>
-          </a:p>
-          <a:p>
-            <a:pPr marL="205740" indent="-228600">
-              <a:buFont typeface="Calibri" panose="020F0502020204030204" pitchFamily="34" charset="0"/>
-              <a:buChar char="•"/>
-            </a:pPr>
-            <a:r>
-              <a:rPr lang="pt-PT" dirty="0" err="1">
-                <a:latin typeface="Helvetica" panose="020B0604020202020204" pitchFamily="34" charset="0"/>
-                <a:cs typeface="Helvetica" panose="020B0604020202020204" pitchFamily="34" charset="0"/>
-              </a:rPr>
-              <a:t>Conclusion</a:t>
-            </a:r>
-            <a:r>
-              <a:rPr lang="pt-PT" dirty="0">
-                <a:latin typeface="Helvetica" panose="020B0604020202020204" pitchFamily="34" charset="0"/>
-                <a:cs typeface="Helvetica" panose="020B0604020202020204" pitchFamily="34" charset="0"/>
-              </a:rPr>
-              <a:t> </a:t>
-            </a:r>
-            <a:r>
-              <a:rPr lang="pt-PT" dirty="0" err="1">
-                <a:latin typeface="Helvetica" panose="020B0604020202020204" pitchFamily="34" charset="0"/>
-                <a:cs typeface="Helvetica" panose="020B0604020202020204" pitchFamily="34" charset="0"/>
-              </a:rPr>
-              <a:t>and</a:t>
-            </a:r>
-            <a:r>
-              <a:rPr lang="pt-PT" dirty="0">
-                <a:latin typeface="Helvetica" panose="020B0604020202020204" pitchFamily="34" charset="0"/>
-                <a:cs typeface="Helvetica" panose="020B0604020202020204" pitchFamily="34" charset="0"/>
-              </a:rPr>
-              <a:t> future </a:t>
-            </a:r>
-            <a:r>
-              <a:rPr lang="pt-PT" dirty="0" err="1">
-                <a:latin typeface="Helvetica" panose="020B0604020202020204" pitchFamily="34" charset="0"/>
-                <a:cs typeface="Helvetica" panose="020B0604020202020204" pitchFamily="34" charset="0"/>
-              </a:rPr>
-              <a:t>work</a:t>
-            </a:r>
-            <a:endParaRPr lang="pt-PT" dirty="0">
-              <a:latin typeface="Helvetica" panose="020B0604020202020204" pitchFamily="34" charset="0"/>
-              <a:cs typeface="Helvetica" panose="020B0604020202020204" pitchFamily="34" charset="0"/>
-            </a:endParaRPr>
           </a:p>
           <a:p>
             <a:pPr lvl="1"/>
@@ -5079,6 +4803,1130 @@
           </a:p>
         </p:txBody>
       </p:sp>
+      <p:sp>
+        <p:nvSpPr>
+          <p:cNvPr id="3" name="Marcador de Posição de Conteúdo 5">
+            <a:extLst>
+              <a:ext uri="{FF2B5EF4-FFF2-40B4-BE49-F238E27FC236}">
+                <a16:creationId xmlns:a16="http://schemas.microsoft.com/office/drawing/2014/main" id="{4F466E8A-4897-E6F2-EEB7-8662550C8303}"/>
+              </a:ext>
+            </a:extLst>
+          </p:cNvPr>
+          <p:cNvSpPr txBox="1">
+            <a:spLocks/>
+          </p:cNvSpPr>
+          <p:nvPr/>
+        </p:nvSpPr>
+        <p:spPr>
+          <a:xfrm>
+            <a:off x="1089539" y="2722604"/>
+            <a:ext cx="10515600" cy="1061551"/>
+          </a:xfrm>
+          <a:prstGeom prst="rect">
+            <a:avLst/>
+          </a:prstGeom>
+        </p:spPr>
+        <p:txBody>
+          <a:bodyPr vert="horz" lIns="0" tIns="45720" rIns="0" bIns="45720" rtlCol="0">
+            <a:normAutofit lnSpcReduction="10000"/>
+          </a:bodyPr>
+          <a:lstStyle>
+            <a:lvl1pPr marL="91440" indent="-91440" algn="l" defTabSz="914400" rtl="0" eaLnBrk="1" latinLnBrk="0" hangingPunct="1">
+              <a:lnSpc>
+                <a:spcPct val="90000"/>
+              </a:lnSpc>
+              <a:spcBef>
+                <a:spcPts val="1200"/>
+              </a:spcBef>
+              <a:spcAft>
+                <a:spcPts val="200"/>
+              </a:spcAft>
+              <a:buClr>
+                <a:schemeClr val="accent1"/>
+              </a:buClr>
+              <a:buSzPct val="100000"/>
+              <a:buFont typeface="Calibri" panose="020F0502020204030204" pitchFamily="34" charset="0"/>
+              <a:buChar char=" "/>
+              <a:defRPr sz="2000" kern="1200">
+                <a:solidFill>
+                  <a:schemeClr val="tx1">
+                    <a:lumMod val="75000"/>
+                    <a:lumOff val="25000"/>
+                  </a:schemeClr>
+                </a:solidFill>
+                <a:latin typeface="+mn-lt"/>
+                <a:ea typeface="+mn-ea"/>
+                <a:cs typeface="+mn-cs"/>
+              </a:defRPr>
+            </a:lvl1pPr>
+            <a:lvl2pPr marL="384048" indent="-182880" algn="l" defTabSz="914400" rtl="0" eaLnBrk="1" latinLnBrk="0" hangingPunct="1">
+              <a:lnSpc>
+                <a:spcPct val="90000"/>
+              </a:lnSpc>
+              <a:spcBef>
+                <a:spcPts val="200"/>
+              </a:spcBef>
+              <a:spcAft>
+                <a:spcPts val="400"/>
+              </a:spcAft>
+              <a:buClr>
+                <a:schemeClr val="accent1"/>
+              </a:buClr>
+              <a:buFont typeface="Calibri" pitchFamily="34" charset="0"/>
+              <a:buChar char="◦"/>
+              <a:defRPr sz="1800" kern="1200">
+                <a:solidFill>
+                  <a:schemeClr val="tx1">
+                    <a:lumMod val="75000"/>
+                    <a:lumOff val="25000"/>
+                  </a:schemeClr>
+                </a:solidFill>
+                <a:latin typeface="+mn-lt"/>
+                <a:ea typeface="+mn-ea"/>
+                <a:cs typeface="+mn-cs"/>
+              </a:defRPr>
+            </a:lvl2pPr>
+            <a:lvl3pPr marL="566928" indent="-182880" algn="l" defTabSz="914400" rtl="0" eaLnBrk="1" latinLnBrk="0" hangingPunct="1">
+              <a:lnSpc>
+                <a:spcPct val="90000"/>
+              </a:lnSpc>
+              <a:spcBef>
+                <a:spcPts val="200"/>
+              </a:spcBef>
+              <a:spcAft>
+                <a:spcPts val="400"/>
+              </a:spcAft>
+              <a:buClr>
+                <a:schemeClr val="accent1"/>
+              </a:buClr>
+              <a:buFont typeface="Calibri" pitchFamily="34" charset="0"/>
+              <a:buChar char="◦"/>
+              <a:defRPr sz="1400" kern="1200">
+                <a:solidFill>
+                  <a:schemeClr val="tx1">
+                    <a:lumMod val="75000"/>
+                    <a:lumOff val="25000"/>
+                  </a:schemeClr>
+                </a:solidFill>
+                <a:latin typeface="+mn-lt"/>
+                <a:ea typeface="+mn-ea"/>
+                <a:cs typeface="+mn-cs"/>
+              </a:defRPr>
+            </a:lvl3pPr>
+            <a:lvl4pPr marL="749808" indent="-182880" algn="l" defTabSz="914400" rtl="0" eaLnBrk="1" latinLnBrk="0" hangingPunct="1">
+              <a:lnSpc>
+                <a:spcPct val="90000"/>
+              </a:lnSpc>
+              <a:spcBef>
+                <a:spcPts val="200"/>
+              </a:spcBef>
+              <a:spcAft>
+                <a:spcPts val="400"/>
+              </a:spcAft>
+              <a:buClr>
+                <a:schemeClr val="accent1"/>
+              </a:buClr>
+              <a:buFont typeface="Calibri" pitchFamily="34" charset="0"/>
+              <a:buChar char="◦"/>
+              <a:defRPr sz="1400" kern="1200">
+                <a:solidFill>
+                  <a:schemeClr val="tx1">
+                    <a:lumMod val="75000"/>
+                    <a:lumOff val="25000"/>
+                  </a:schemeClr>
+                </a:solidFill>
+                <a:latin typeface="+mn-lt"/>
+                <a:ea typeface="+mn-ea"/>
+                <a:cs typeface="+mn-cs"/>
+              </a:defRPr>
+            </a:lvl4pPr>
+            <a:lvl5pPr marL="932688" indent="-182880" algn="l" defTabSz="914400" rtl="0" eaLnBrk="1" latinLnBrk="0" hangingPunct="1">
+              <a:lnSpc>
+                <a:spcPct val="90000"/>
+              </a:lnSpc>
+              <a:spcBef>
+                <a:spcPts val="200"/>
+              </a:spcBef>
+              <a:spcAft>
+                <a:spcPts val="400"/>
+              </a:spcAft>
+              <a:buClr>
+                <a:schemeClr val="accent1"/>
+              </a:buClr>
+              <a:buFont typeface="Calibri" pitchFamily="34" charset="0"/>
+              <a:buChar char="◦"/>
+              <a:defRPr sz="1400" kern="1200">
+                <a:solidFill>
+                  <a:schemeClr val="tx1">
+                    <a:lumMod val="75000"/>
+                    <a:lumOff val="25000"/>
+                  </a:schemeClr>
+                </a:solidFill>
+                <a:latin typeface="+mn-lt"/>
+                <a:ea typeface="+mn-ea"/>
+                <a:cs typeface="+mn-cs"/>
+              </a:defRPr>
+            </a:lvl5pPr>
+            <a:lvl6pPr marL="1100000" indent="-228600" algn="l" defTabSz="914400" rtl="0" eaLnBrk="1" latinLnBrk="0" hangingPunct="1">
+              <a:lnSpc>
+                <a:spcPct val="90000"/>
+              </a:lnSpc>
+              <a:spcBef>
+                <a:spcPts val="200"/>
+              </a:spcBef>
+              <a:spcAft>
+                <a:spcPts val="400"/>
+              </a:spcAft>
+              <a:buClr>
+                <a:schemeClr val="accent1"/>
+              </a:buClr>
+              <a:buFont typeface="Calibri" pitchFamily="34" charset="0"/>
+              <a:buChar char="◦"/>
+              <a:defRPr sz="1400" kern="1200">
+                <a:solidFill>
+                  <a:schemeClr val="tx1">
+                    <a:lumMod val="75000"/>
+                    <a:lumOff val="25000"/>
+                  </a:schemeClr>
+                </a:solidFill>
+                <a:latin typeface="+mn-lt"/>
+                <a:ea typeface="+mn-ea"/>
+                <a:cs typeface="+mn-cs"/>
+              </a:defRPr>
+            </a:lvl6pPr>
+            <a:lvl7pPr marL="1300000" indent="-228600" algn="l" defTabSz="914400" rtl="0" eaLnBrk="1" latinLnBrk="0" hangingPunct="1">
+              <a:lnSpc>
+                <a:spcPct val="90000"/>
+              </a:lnSpc>
+              <a:spcBef>
+                <a:spcPts val="200"/>
+              </a:spcBef>
+              <a:spcAft>
+                <a:spcPts val="400"/>
+              </a:spcAft>
+              <a:buClr>
+                <a:schemeClr val="accent1"/>
+              </a:buClr>
+              <a:buFont typeface="Calibri" pitchFamily="34" charset="0"/>
+              <a:buChar char="◦"/>
+              <a:defRPr sz="1400" kern="1200">
+                <a:solidFill>
+                  <a:schemeClr val="tx1">
+                    <a:lumMod val="75000"/>
+                    <a:lumOff val="25000"/>
+                  </a:schemeClr>
+                </a:solidFill>
+                <a:latin typeface="+mn-lt"/>
+                <a:ea typeface="+mn-ea"/>
+                <a:cs typeface="+mn-cs"/>
+              </a:defRPr>
+            </a:lvl7pPr>
+            <a:lvl8pPr marL="1500000" indent="-228600" algn="l" defTabSz="914400" rtl="0" eaLnBrk="1" latinLnBrk="0" hangingPunct="1">
+              <a:lnSpc>
+                <a:spcPct val="90000"/>
+              </a:lnSpc>
+              <a:spcBef>
+                <a:spcPts val="200"/>
+              </a:spcBef>
+              <a:spcAft>
+                <a:spcPts val="400"/>
+              </a:spcAft>
+              <a:buClr>
+                <a:schemeClr val="accent1"/>
+              </a:buClr>
+              <a:buFont typeface="Calibri" pitchFamily="34" charset="0"/>
+              <a:buChar char="◦"/>
+              <a:defRPr sz="1400" kern="1200">
+                <a:solidFill>
+                  <a:schemeClr val="tx1">
+                    <a:lumMod val="75000"/>
+                    <a:lumOff val="25000"/>
+                  </a:schemeClr>
+                </a:solidFill>
+                <a:latin typeface="+mn-lt"/>
+                <a:ea typeface="+mn-ea"/>
+                <a:cs typeface="+mn-cs"/>
+              </a:defRPr>
+            </a:lvl8pPr>
+            <a:lvl9pPr marL="1700000" indent="-228600" algn="l" defTabSz="914400" rtl="0" eaLnBrk="1" latinLnBrk="0" hangingPunct="1">
+              <a:lnSpc>
+                <a:spcPct val="90000"/>
+              </a:lnSpc>
+              <a:spcBef>
+                <a:spcPts val="200"/>
+              </a:spcBef>
+              <a:spcAft>
+                <a:spcPts val="400"/>
+              </a:spcAft>
+              <a:buClr>
+                <a:schemeClr val="accent1"/>
+              </a:buClr>
+              <a:buFont typeface="Calibri" pitchFamily="34" charset="0"/>
+              <a:buChar char="◦"/>
+              <a:defRPr sz="1400" kern="1200">
+                <a:solidFill>
+                  <a:schemeClr val="tx1">
+                    <a:lumMod val="75000"/>
+                    <a:lumOff val="25000"/>
+                  </a:schemeClr>
+                </a:solidFill>
+                <a:latin typeface="+mn-lt"/>
+                <a:ea typeface="+mn-ea"/>
+                <a:cs typeface="+mn-cs"/>
+              </a:defRPr>
+            </a:lvl9pPr>
+          </a:lstStyle>
+          <a:p>
+            <a:pPr marL="205740" indent="-228600">
+              <a:buFont typeface="Calibri" panose="020F0502020204030204" pitchFamily="34" charset="0"/>
+              <a:buChar char="•"/>
+            </a:pPr>
+            <a:r>
+              <a:rPr lang="pt-PT" dirty="0" err="1">
+                <a:latin typeface="Helvetica" panose="020B0604020202020204" pitchFamily="34" charset="0"/>
+                <a:cs typeface="Helvetica" panose="020B0604020202020204" pitchFamily="34" charset="0"/>
+              </a:rPr>
+              <a:t>Dataset</a:t>
+            </a:r>
+            <a:r>
+              <a:rPr lang="pt-PT" dirty="0">
+                <a:latin typeface="Helvetica" panose="020B0604020202020204" pitchFamily="34" charset="0"/>
+                <a:cs typeface="Helvetica" panose="020B0604020202020204" pitchFamily="34" charset="0"/>
+              </a:rPr>
+              <a:t> </a:t>
+            </a:r>
+            <a:r>
+              <a:rPr lang="pt-PT" dirty="0" err="1">
+                <a:latin typeface="Helvetica" panose="020B0604020202020204" pitchFamily="34" charset="0"/>
+                <a:cs typeface="Helvetica" panose="020B0604020202020204" pitchFamily="34" charset="0"/>
+              </a:rPr>
+              <a:t>Characterization</a:t>
+            </a:r>
+            <a:r>
+              <a:rPr lang="pt-PT" dirty="0">
+                <a:latin typeface="Helvetica" panose="020B0604020202020204" pitchFamily="34" charset="0"/>
+                <a:cs typeface="Helvetica" panose="020B0604020202020204" pitchFamily="34" charset="0"/>
+              </a:rPr>
+              <a:t> </a:t>
+            </a:r>
+            <a:r>
+              <a:rPr lang="pt-PT" dirty="0" err="1">
+                <a:latin typeface="Helvetica" panose="020B0604020202020204" pitchFamily="34" charset="0"/>
+                <a:cs typeface="Helvetica" panose="020B0604020202020204" pitchFamily="34" charset="0"/>
+              </a:rPr>
+              <a:t>and</a:t>
+            </a:r>
+            <a:r>
+              <a:rPr lang="pt-PT" dirty="0">
+                <a:latin typeface="Helvetica" panose="020B0604020202020204" pitchFamily="34" charset="0"/>
+                <a:cs typeface="Helvetica" panose="020B0604020202020204" pitchFamily="34" charset="0"/>
+              </a:rPr>
+              <a:t> </a:t>
+            </a:r>
+            <a:r>
+              <a:rPr lang="pt-PT" dirty="0" err="1">
+                <a:latin typeface="Helvetica" panose="020B0604020202020204" pitchFamily="34" charset="0"/>
+                <a:cs typeface="Helvetica" panose="020B0604020202020204" pitchFamily="34" charset="0"/>
+              </a:rPr>
+              <a:t>Preprocessing</a:t>
+            </a:r>
+            <a:endParaRPr lang="pt-PT" dirty="0">
+              <a:latin typeface="Helvetica" panose="020B0604020202020204" pitchFamily="34" charset="0"/>
+              <a:cs typeface="Helvetica" panose="020B0604020202020204" pitchFamily="34" charset="0"/>
+            </a:endParaRPr>
+          </a:p>
+          <a:p>
+            <a:pPr marL="441198" lvl="1" indent="-228600">
+              <a:buFont typeface="Calibri" pitchFamily="34" charset="0"/>
+              <a:buChar char="•"/>
+            </a:pPr>
+            <a:r>
+              <a:rPr lang="pt-PT" sz="2000" dirty="0">
+                <a:latin typeface="Helvetica" panose="020B0604020202020204" pitchFamily="34" charset="0"/>
+                <a:cs typeface="Helvetica" panose="020B0604020202020204" pitchFamily="34" charset="0"/>
+              </a:rPr>
+              <a:t>Data </a:t>
+            </a:r>
+            <a:r>
+              <a:rPr lang="pt-PT" sz="2000" dirty="0" err="1">
+                <a:latin typeface="Helvetica" panose="020B0604020202020204" pitchFamily="34" charset="0"/>
+                <a:cs typeface="Helvetica" panose="020B0604020202020204" pitchFamily="34" charset="0"/>
+              </a:rPr>
+              <a:t>Imputation</a:t>
+            </a:r>
+            <a:r>
+              <a:rPr lang="pt-PT" sz="2000" dirty="0">
+                <a:latin typeface="Helvetica" panose="020B0604020202020204" pitchFamily="34" charset="0"/>
+                <a:cs typeface="Helvetica" panose="020B0604020202020204" pitchFamily="34" charset="0"/>
+              </a:rPr>
+              <a:t> </a:t>
+            </a:r>
+            <a:r>
+              <a:rPr lang="pt-PT" sz="2000" dirty="0" err="1">
+                <a:latin typeface="Helvetica" panose="020B0604020202020204" pitchFamily="34" charset="0"/>
+                <a:cs typeface="Helvetica" panose="020B0604020202020204" pitchFamily="34" charset="0"/>
+              </a:rPr>
+              <a:t>and</a:t>
+            </a:r>
+            <a:r>
+              <a:rPr lang="pt-PT" sz="2000" dirty="0">
+                <a:latin typeface="Helvetica" panose="020B0604020202020204" pitchFamily="34" charset="0"/>
+                <a:cs typeface="Helvetica" panose="020B0604020202020204" pitchFamily="34" charset="0"/>
+              </a:rPr>
+              <a:t> </a:t>
+            </a:r>
+            <a:r>
+              <a:rPr lang="pt-PT" sz="2000" dirty="0" err="1">
+                <a:latin typeface="Helvetica" panose="020B0604020202020204" pitchFamily="34" charset="0"/>
+                <a:cs typeface="Helvetica" panose="020B0604020202020204" pitchFamily="34" charset="0"/>
+              </a:rPr>
+              <a:t>dimensionality</a:t>
+            </a:r>
+            <a:r>
+              <a:rPr lang="pt-PT" sz="2000" dirty="0">
+                <a:latin typeface="Helvetica" panose="020B0604020202020204" pitchFamily="34" charset="0"/>
+                <a:cs typeface="Helvetica" panose="020B0604020202020204" pitchFamily="34" charset="0"/>
+              </a:rPr>
+              <a:t> </a:t>
+            </a:r>
+            <a:r>
+              <a:rPr lang="pt-PT" sz="2000" dirty="0" err="1">
+                <a:latin typeface="Helvetica" panose="020B0604020202020204" pitchFamily="34" charset="0"/>
+                <a:cs typeface="Helvetica" panose="020B0604020202020204" pitchFamily="34" charset="0"/>
+              </a:rPr>
+              <a:t>reduction</a:t>
+            </a:r>
+            <a:endParaRPr lang="pt-PT" sz="2000" dirty="0">
+              <a:latin typeface="Helvetica" panose="020B0604020202020204" pitchFamily="34" charset="0"/>
+              <a:cs typeface="Helvetica" panose="020B0604020202020204" pitchFamily="34" charset="0"/>
+            </a:endParaRPr>
+          </a:p>
+          <a:p>
+            <a:pPr marL="441198" lvl="1" indent="-228600">
+              <a:buFont typeface="Calibri" pitchFamily="34" charset="0"/>
+              <a:buChar char="•"/>
+            </a:pPr>
+            <a:r>
+              <a:rPr lang="pt-PT" sz="2000" dirty="0" err="1">
+                <a:latin typeface="Helvetica" panose="020B0604020202020204" pitchFamily="34" charset="0"/>
+                <a:cs typeface="Helvetica" panose="020B0604020202020204" pitchFamily="34" charset="0"/>
+              </a:rPr>
+              <a:t>Questioning</a:t>
+            </a:r>
+            <a:endParaRPr lang="pt-PT" sz="2000" dirty="0">
+              <a:latin typeface="Helvetica" panose="020B0604020202020204" pitchFamily="34" charset="0"/>
+              <a:cs typeface="Helvetica" panose="020B0604020202020204" pitchFamily="34" charset="0"/>
+            </a:endParaRPr>
+          </a:p>
+          <a:p>
+            <a:pPr lvl="1"/>
+            <a:endParaRPr lang="pt-PT" dirty="0">
+              <a:latin typeface="Helvetica" panose="020B0604020202020204" pitchFamily="34" charset="0"/>
+              <a:cs typeface="Helvetica" panose="020B0604020202020204" pitchFamily="34" charset="0"/>
+            </a:endParaRPr>
+          </a:p>
+        </p:txBody>
+      </p:sp>
+      <p:sp>
+        <p:nvSpPr>
+          <p:cNvPr id="5" name="Marcador de Posição de Conteúdo 5">
+            <a:extLst>
+              <a:ext uri="{FF2B5EF4-FFF2-40B4-BE49-F238E27FC236}">
+                <a16:creationId xmlns:a16="http://schemas.microsoft.com/office/drawing/2014/main" id="{12CFAE1F-EDCD-2527-5BEA-7F65418A51D3}"/>
+              </a:ext>
+            </a:extLst>
+          </p:cNvPr>
+          <p:cNvSpPr txBox="1">
+            <a:spLocks/>
+          </p:cNvSpPr>
+          <p:nvPr/>
+        </p:nvSpPr>
+        <p:spPr>
+          <a:xfrm>
+            <a:off x="1097280" y="3844879"/>
+            <a:ext cx="10515600" cy="1059782"/>
+          </a:xfrm>
+          <a:prstGeom prst="rect">
+            <a:avLst/>
+          </a:prstGeom>
+        </p:spPr>
+        <p:txBody>
+          <a:bodyPr vert="horz" lIns="0" tIns="45720" rIns="0" bIns="45720" rtlCol="0">
+            <a:normAutofit lnSpcReduction="10000"/>
+          </a:bodyPr>
+          <a:lstStyle>
+            <a:lvl1pPr marL="91440" indent="-91440" algn="l" defTabSz="914400" rtl="0" eaLnBrk="1" latinLnBrk="0" hangingPunct="1">
+              <a:lnSpc>
+                <a:spcPct val="90000"/>
+              </a:lnSpc>
+              <a:spcBef>
+                <a:spcPts val="1200"/>
+              </a:spcBef>
+              <a:spcAft>
+                <a:spcPts val="200"/>
+              </a:spcAft>
+              <a:buClr>
+                <a:schemeClr val="accent1"/>
+              </a:buClr>
+              <a:buSzPct val="100000"/>
+              <a:buFont typeface="Calibri" panose="020F0502020204030204" pitchFamily="34" charset="0"/>
+              <a:buChar char=" "/>
+              <a:defRPr sz="2000" kern="1200">
+                <a:solidFill>
+                  <a:schemeClr val="tx1">
+                    <a:lumMod val="75000"/>
+                    <a:lumOff val="25000"/>
+                  </a:schemeClr>
+                </a:solidFill>
+                <a:latin typeface="+mn-lt"/>
+                <a:ea typeface="+mn-ea"/>
+                <a:cs typeface="+mn-cs"/>
+              </a:defRPr>
+            </a:lvl1pPr>
+            <a:lvl2pPr marL="384048" indent="-182880" algn="l" defTabSz="914400" rtl="0" eaLnBrk="1" latinLnBrk="0" hangingPunct="1">
+              <a:lnSpc>
+                <a:spcPct val="90000"/>
+              </a:lnSpc>
+              <a:spcBef>
+                <a:spcPts val="200"/>
+              </a:spcBef>
+              <a:spcAft>
+                <a:spcPts val="400"/>
+              </a:spcAft>
+              <a:buClr>
+                <a:schemeClr val="accent1"/>
+              </a:buClr>
+              <a:buFont typeface="Calibri" pitchFamily="34" charset="0"/>
+              <a:buChar char="◦"/>
+              <a:defRPr sz="1800" kern="1200">
+                <a:solidFill>
+                  <a:schemeClr val="tx1">
+                    <a:lumMod val="75000"/>
+                    <a:lumOff val="25000"/>
+                  </a:schemeClr>
+                </a:solidFill>
+                <a:latin typeface="+mn-lt"/>
+                <a:ea typeface="+mn-ea"/>
+                <a:cs typeface="+mn-cs"/>
+              </a:defRPr>
+            </a:lvl2pPr>
+            <a:lvl3pPr marL="566928" indent="-182880" algn="l" defTabSz="914400" rtl="0" eaLnBrk="1" latinLnBrk="0" hangingPunct="1">
+              <a:lnSpc>
+                <a:spcPct val="90000"/>
+              </a:lnSpc>
+              <a:spcBef>
+                <a:spcPts val="200"/>
+              </a:spcBef>
+              <a:spcAft>
+                <a:spcPts val="400"/>
+              </a:spcAft>
+              <a:buClr>
+                <a:schemeClr val="accent1"/>
+              </a:buClr>
+              <a:buFont typeface="Calibri" pitchFamily="34" charset="0"/>
+              <a:buChar char="◦"/>
+              <a:defRPr sz="1400" kern="1200">
+                <a:solidFill>
+                  <a:schemeClr val="tx1">
+                    <a:lumMod val="75000"/>
+                    <a:lumOff val="25000"/>
+                  </a:schemeClr>
+                </a:solidFill>
+                <a:latin typeface="+mn-lt"/>
+                <a:ea typeface="+mn-ea"/>
+                <a:cs typeface="+mn-cs"/>
+              </a:defRPr>
+            </a:lvl3pPr>
+            <a:lvl4pPr marL="749808" indent="-182880" algn="l" defTabSz="914400" rtl="0" eaLnBrk="1" latinLnBrk="0" hangingPunct="1">
+              <a:lnSpc>
+                <a:spcPct val="90000"/>
+              </a:lnSpc>
+              <a:spcBef>
+                <a:spcPts val="200"/>
+              </a:spcBef>
+              <a:spcAft>
+                <a:spcPts val="400"/>
+              </a:spcAft>
+              <a:buClr>
+                <a:schemeClr val="accent1"/>
+              </a:buClr>
+              <a:buFont typeface="Calibri" pitchFamily="34" charset="0"/>
+              <a:buChar char="◦"/>
+              <a:defRPr sz="1400" kern="1200">
+                <a:solidFill>
+                  <a:schemeClr val="tx1">
+                    <a:lumMod val="75000"/>
+                    <a:lumOff val="25000"/>
+                  </a:schemeClr>
+                </a:solidFill>
+                <a:latin typeface="+mn-lt"/>
+                <a:ea typeface="+mn-ea"/>
+                <a:cs typeface="+mn-cs"/>
+              </a:defRPr>
+            </a:lvl4pPr>
+            <a:lvl5pPr marL="932688" indent="-182880" algn="l" defTabSz="914400" rtl="0" eaLnBrk="1" latinLnBrk="0" hangingPunct="1">
+              <a:lnSpc>
+                <a:spcPct val="90000"/>
+              </a:lnSpc>
+              <a:spcBef>
+                <a:spcPts val="200"/>
+              </a:spcBef>
+              <a:spcAft>
+                <a:spcPts val="400"/>
+              </a:spcAft>
+              <a:buClr>
+                <a:schemeClr val="accent1"/>
+              </a:buClr>
+              <a:buFont typeface="Calibri" pitchFamily="34" charset="0"/>
+              <a:buChar char="◦"/>
+              <a:defRPr sz="1400" kern="1200">
+                <a:solidFill>
+                  <a:schemeClr val="tx1">
+                    <a:lumMod val="75000"/>
+                    <a:lumOff val="25000"/>
+                  </a:schemeClr>
+                </a:solidFill>
+                <a:latin typeface="+mn-lt"/>
+                <a:ea typeface="+mn-ea"/>
+                <a:cs typeface="+mn-cs"/>
+              </a:defRPr>
+            </a:lvl5pPr>
+            <a:lvl6pPr marL="1100000" indent="-228600" algn="l" defTabSz="914400" rtl="0" eaLnBrk="1" latinLnBrk="0" hangingPunct="1">
+              <a:lnSpc>
+                <a:spcPct val="90000"/>
+              </a:lnSpc>
+              <a:spcBef>
+                <a:spcPts val="200"/>
+              </a:spcBef>
+              <a:spcAft>
+                <a:spcPts val="400"/>
+              </a:spcAft>
+              <a:buClr>
+                <a:schemeClr val="accent1"/>
+              </a:buClr>
+              <a:buFont typeface="Calibri" pitchFamily="34" charset="0"/>
+              <a:buChar char="◦"/>
+              <a:defRPr sz="1400" kern="1200">
+                <a:solidFill>
+                  <a:schemeClr val="tx1">
+                    <a:lumMod val="75000"/>
+                    <a:lumOff val="25000"/>
+                  </a:schemeClr>
+                </a:solidFill>
+                <a:latin typeface="+mn-lt"/>
+                <a:ea typeface="+mn-ea"/>
+                <a:cs typeface="+mn-cs"/>
+              </a:defRPr>
+            </a:lvl6pPr>
+            <a:lvl7pPr marL="1300000" indent="-228600" algn="l" defTabSz="914400" rtl="0" eaLnBrk="1" latinLnBrk="0" hangingPunct="1">
+              <a:lnSpc>
+                <a:spcPct val="90000"/>
+              </a:lnSpc>
+              <a:spcBef>
+                <a:spcPts val="200"/>
+              </a:spcBef>
+              <a:spcAft>
+                <a:spcPts val="400"/>
+              </a:spcAft>
+              <a:buClr>
+                <a:schemeClr val="accent1"/>
+              </a:buClr>
+              <a:buFont typeface="Calibri" pitchFamily="34" charset="0"/>
+              <a:buChar char="◦"/>
+              <a:defRPr sz="1400" kern="1200">
+                <a:solidFill>
+                  <a:schemeClr val="tx1">
+                    <a:lumMod val="75000"/>
+                    <a:lumOff val="25000"/>
+                  </a:schemeClr>
+                </a:solidFill>
+                <a:latin typeface="+mn-lt"/>
+                <a:ea typeface="+mn-ea"/>
+                <a:cs typeface="+mn-cs"/>
+              </a:defRPr>
+            </a:lvl7pPr>
+            <a:lvl8pPr marL="1500000" indent="-228600" algn="l" defTabSz="914400" rtl="0" eaLnBrk="1" latinLnBrk="0" hangingPunct="1">
+              <a:lnSpc>
+                <a:spcPct val="90000"/>
+              </a:lnSpc>
+              <a:spcBef>
+                <a:spcPts val="200"/>
+              </a:spcBef>
+              <a:spcAft>
+                <a:spcPts val="400"/>
+              </a:spcAft>
+              <a:buClr>
+                <a:schemeClr val="accent1"/>
+              </a:buClr>
+              <a:buFont typeface="Calibri" pitchFamily="34" charset="0"/>
+              <a:buChar char="◦"/>
+              <a:defRPr sz="1400" kern="1200">
+                <a:solidFill>
+                  <a:schemeClr val="tx1">
+                    <a:lumMod val="75000"/>
+                    <a:lumOff val="25000"/>
+                  </a:schemeClr>
+                </a:solidFill>
+                <a:latin typeface="+mn-lt"/>
+                <a:ea typeface="+mn-ea"/>
+                <a:cs typeface="+mn-cs"/>
+              </a:defRPr>
+            </a:lvl8pPr>
+            <a:lvl9pPr marL="1700000" indent="-228600" algn="l" defTabSz="914400" rtl="0" eaLnBrk="1" latinLnBrk="0" hangingPunct="1">
+              <a:lnSpc>
+                <a:spcPct val="90000"/>
+              </a:lnSpc>
+              <a:spcBef>
+                <a:spcPts val="200"/>
+              </a:spcBef>
+              <a:spcAft>
+                <a:spcPts val="400"/>
+              </a:spcAft>
+              <a:buClr>
+                <a:schemeClr val="accent1"/>
+              </a:buClr>
+              <a:buFont typeface="Calibri" pitchFamily="34" charset="0"/>
+              <a:buChar char="◦"/>
+              <a:defRPr sz="1400" kern="1200">
+                <a:solidFill>
+                  <a:schemeClr val="tx1">
+                    <a:lumMod val="75000"/>
+                    <a:lumOff val="25000"/>
+                  </a:schemeClr>
+                </a:solidFill>
+                <a:latin typeface="+mn-lt"/>
+                <a:ea typeface="+mn-ea"/>
+                <a:cs typeface="+mn-cs"/>
+              </a:defRPr>
+            </a:lvl9pPr>
+          </a:lstStyle>
+          <a:p>
+            <a:pPr marL="205740" indent="-228600">
+              <a:buFont typeface="Calibri" panose="020F0502020204030204" pitchFamily="34" charset="0"/>
+              <a:buChar char="•"/>
+            </a:pPr>
+            <a:r>
+              <a:rPr lang="en-US" dirty="0">
+                <a:latin typeface="Helvetica" panose="020B0604020202020204" pitchFamily="34" charset="0"/>
+                <a:cs typeface="Helvetica" panose="020B0604020202020204" pitchFamily="34" charset="0"/>
+              </a:rPr>
+              <a:t>Application of Models and Performance Assessment</a:t>
+            </a:r>
+          </a:p>
+          <a:p>
+            <a:pPr marL="441198" lvl="1" indent="-228600">
+              <a:buFont typeface="Calibri" pitchFamily="34" charset="0"/>
+              <a:buChar char="•"/>
+            </a:pPr>
+            <a:r>
+              <a:rPr lang="pt-PT" sz="2000" dirty="0" err="1">
+                <a:latin typeface="Helvetica" panose="020B0604020202020204" pitchFamily="34" charset="0"/>
+                <a:cs typeface="Helvetica" panose="020B0604020202020204" pitchFamily="34" charset="0"/>
+              </a:rPr>
+              <a:t>Model</a:t>
+            </a:r>
+            <a:r>
+              <a:rPr lang="pt-PT" sz="2000" dirty="0">
+                <a:latin typeface="Helvetica" panose="020B0604020202020204" pitchFamily="34" charset="0"/>
+                <a:cs typeface="Helvetica" panose="020B0604020202020204" pitchFamily="34" charset="0"/>
+              </a:rPr>
+              <a:t> </a:t>
+            </a:r>
+            <a:r>
+              <a:rPr lang="pt-PT" sz="2000" dirty="0" err="1">
+                <a:latin typeface="Helvetica" panose="020B0604020202020204" pitchFamily="34" charset="0"/>
+                <a:cs typeface="Helvetica" panose="020B0604020202020204" pitchFamily="34" charset="0"/>
+              </a:rPr>
+              <a:t>comparison</a:t>
+            </a:r>
+            <a:endParaRPr lang="pt-PT" sz="2000" dirty="0">
+              <a:latin typeface="Helvetica" panose="020B0604020202020204" pitchFamily="34" charset="0"/>
+              <a:cs typeface="Helvetica" panose="020B0604020202020204" pitchFamily="34" charset="0"/>
+            </a:endParaRPr>
+          </a:p>
+          <a:p>
+            <a:pPr marL="441198" lvl="1" indent="-228600">
+              <a:buFont typeface="Calibri" pitchFamily="34" charset="0"/>
+              <a:buChar char="•"/>
+            </a:pPr>
+            <a:r>
+              <a:rPr lang="pt-PT" sz="2000" dirty="0" err="1">
+                <a:latin typeface="Helvetica" panose="020B0604020202020204" pitchFamily="34" charset="0"/>
+                <a:cs typeface="Helvetica" panose="020B0604020202020204" pitchFamily="34" charset="0"/>
+              </a:rPr>
+              <a:t>Sampling</a:t>
+            </a:r>
+            <a:r>
+              <a:rPr lang="pt-PT" sz="2000" dirty="0">
+                <a:latin typeface="Helvetica" panose="020B0604020202020204" pitchFamily="34" charset="0"/>
+                <a:cs typeface="Helvetica" panose="020B0604020202020204" pitchFamily="34" charset="0"/>
+              </a:rPr>
+              <a:t> </a:t>
+            </a:r>
+            <a:r>
+              <a:rPr lang="pt-PT" sz="2000" dirty="0" err="1">
+                <a:latin typeface="Helvetica" panose="020B0604020202020204" pitchFamily="34" charset="0"/>
+                <a:cs typeface="Helvetica" panose="020B0604020202020204" pitchFamily="34" charset="0"/>
+              </a:rPr>
+              <a:t>methods</a:t>
+            </a:r>
+            <a:r>
+              <a:rPr lang="pt-PT" sz="2000" dirty="0">
+                <a:latin typeface="Helvetica" panose="020B0604020202020204" pitchFamily="34" charset="0"/>
+                <a:cs typeface="Helvetica" panose="020B0604020202020204" pitchFamily="34" charset="0"/>
+              </a:rPr>
+              <a:t> </a:t>
+            </a:r>
+            <a:r>
+              <a:rPr lang="pt-PT" sz="2000" dirty="0" err="1">
+                <a:latin typeface="Helvetica" panose="020B0604020202020204" pitchFamily="34" charset="0"/>
+                <a:cs typeface="Helvetica" panose="020B0604020202020204" pitchFamily="34" charset="0"/>
+              </a:rPr>
+              <a:t>comparison</a:t>
+            </a:r>
+            <a:endParaRPr lang="pt-PT" sz="2000" dirty="0">
+              <a:latin typeface="Helvetica" panose="020B0604020202020204" pitchFamily="34" charset="0"/>
+              <a:cs typeface="Helvetica" panose="020B0604020202020204" pitchFamily="34" charset="0"/>
+            </a:endParaRPr>
+          </a:p>
+          <a:p>
+            <a:pPr marL="201168" lvl="1" indent="0">
+              <a:buNone/>
+            </a:pPr>
+            <a:endParaRPr lang="pt-PT" dirty="0">
+              <a:latin typeface="Helvetica" panose="020B0604020202020204" pitchFamily="34" charset="0"/>
+              <a:cs typeface="Helvetica" panose="020B0604020202020204" pitchFamily="34" charset="0"/>
+            </a:endParaRPr>
+          </a:p>
+        </p:txBody>
+      </p:sp>
+      <p:sp>
+        <p:nvSpPr>
+          <p:cNvPr id="6" name="Marcador de Posição de Conteúdo 5">
+            <a:extLst>
+              <a:ext uri="{FF2B5EF4-FFF2-40B4-BE49-F238E27FC236}">
+                <a16:creationId xmlns:a16="http://schemas.microsoft.com/office/drawing/2014/main" id="{A2F9C53C-85FA-9CFA-28CE-E0F72683E4EC}"/>
+              </a:ext>
+            </a:extLst>
+          </p:cNvPr>
+          <p:cNvSpPr txBox="1">
+            <a:spLocks/>
+          </p:cNvSpPr>
+          <p:nvPr/>
+        </p:nvSpPr>
+        <p:spPr>
+          <a:xfrm>
+            <a:off x="1097280" y="5070936"/>
+            <a:ext cx="10515600" cy="538162"/>
+          </a:xfrm>
+          <a:prstGeom prst="rect">
+            <a:avLst/>
+          </a:prstGeom>
+        </p:spPr>
+        <p:txBody>
+          <a:bodyPr vert="horz" lIns="0" tIns="45720" rIns="0" bIns="45720" rtlCol="0">
+            <a:normAutofit/>
+          </a:bodyPr>
+          <a:lstStyle>
+            <a:lvl1pPr marL="91440" indent="-91440" algn="l" defTabSz="914400" rtl="0" eaLnBrk="1" latinLnBrk="0" hangingPunct="1">
+              <a:lnSpc>
+                <a:spcPct val="90000"/>
+              </a:lnSpc>
+              <a:spcBef>
+                <a:spcPts val="1200"/>
+              </a:spcBef>
+              <a:spcAft>
+                <a:spcPts val="200"/>
+              </a:spcAft>
+              <a:buClr>
+                <a:schemeClr val="accent1"/>
+              </a:buClr>
+              <a:buSzPct val="100000"/>
+              <a:buFont typeface="Calibri" panose="020F0502020204030204" pitchFamily="34" charset="0"/>
+              <a:buChar char=" "/>
+              <a:defRPr sz="2000" kern="1200">
+                <a:solidFill>
+                  <a:schemeClr val="tx1">
+                    <a:lumMod val="75000"/>
+                    <a:lumOff val="25000"/>
+                  </a:schemeClr>
+                </a:solidFill>
+                <a:latin typeface="+mn-lt"/>
+                <a:ea typeface="+mn-ea"/>
+                <a:cs typeface="+mn-cs"/>
+              </a:defRPr>
+            </a:lvl1pPr>
+            <a:lvl2pPr marL="384048" indent="-182880" algn="l" defTabSz="914400" rtl="0" eaLnBrk="1" latinLnBrk="0" hangingPunct="1">
+              <a:lnSpc>
+                <a:spcPct val="90000"/>
+              </a:lnSpc>
+              <a:spcBef>
+                <a:spcPts val="200"/>
+              </a:spcBef>
+              <a:spcAft>
+                <a:spcPts val="400"/>
+              </a:spcAft>
+              <a:buClr>
+                <a:schemeClr val="accent1"/>
+              </a:buClr>
+              <a:buFont typeface="Calibri" pitchFamily="34" charset="0"/>
+              <a:buChar char="◦"/>
+              <a:defRPr sz="1800" kern="1200">
+                <a:solidFill>
+                  <a:schemeClr val="tx1">
+                    <a:lumMod val="75000"/>
+                    <a:lumOff val="25000"/>
+                  </a:schemeClr>
+                </a:solidFill>
+                <a:latin typeface="+mn-lt"/>
+                <a:ea typeface="+mn-ea"/>
+                <a:cs typeface="+mn-cs"/>
+              </a:defRPr>
+            </a:lvl2pPr>
+            <a:lvl3pPr marL="566928" indent="-182880" algn="l" defTabSz="914400" rtl="0" eaLnBrk="1" latinLnBrk="0" hangingPunct="1">
+              <a:lnSpc>
+                <a:spcPct val="90000"/>
+              </a:lnSpc>
+              <a:spcBef>
+                <a:spcPts val="200"/>
+              </a:spcBef>
+              <a:spcAft>
+                <a:spcPts val="400"/>
+              </a:spcAft>
+              <a:buClr>
+                <a:schemeClr val="accent1"/>
+              </a:buClr>
+              <a:buFont typeface="Calibri" pitchFamily="34" charset="0"/>
+              <a:buChar char="◦"/>
+              <a:defRPr sz="1400" kern="1200">
+                <a:solidFill>
+                  <a:schemeClr val="tx1">
+                    <a:lumMod val="75000"/>
+                    <a:lumOff val="25000"/>
+                  </a:schemeClr>
+                </a:solidFill>
+                <a:latin typeface="+mn-lt"/>
+                <a:ea typeface="+mn-ea"/>
+                <a:cs typeface="+mn-cs"/>
+              </a:defRPr>
+            </a:lvl3pPr>
+            <a:lvl4pPr marL="749808" indent="-182880" algn="l" defTabSz="914400" rtl="0" eaLnBrk="1" latinLnBrk="0" hangingPunct="1">
+              <a:lnSpc>
+                <a:spcPct val="90000"/>
+              </a:lnSpc>
+              <a:spcBef>
+                <a:spcPts val="200"/>
+              </a:spcBef>
+              <a:spcAft>
+                <a:spcPts val="400"/>
+              </a:spcAft>
+              <a:buClr>
+                <a:schemeClr val="accent1"/>
+              </a:buClr>
+              <a:buFont typeface="Calibri" pitchFamily="34" charset="0"/>
+              <a:buChar char="◦"/>
+              <a:defRPr sz="1400" kern="1200">
+                <a:solidFill>
+                  <a:schemeClr val="tx1">
+                    <a:lumMod val="75000"/>
+                    <a:lumOff val="25000"/>
+                  </a:schemeClr>
+                </a:solidFill>
+                <a:latin typeface="+mn-lt"/>
+                <a:ea typeface="+mn-ea"/>
+                <a:cs typeface="+mn-cs"/>
+              </a:defRPr>
+            </a:lvl4pPr>
+            <a:lvl5pPr marL="932688" indent="-182880" algn="l" defTabSz="914400" rtl="0" eaLnBrk="1" latinLnBrk="0" hangingPunct="1">
+              <a:lnSpc>
+                <a:spcPct val="90000"/>
+              </a:lnSpc>
+              <a:spcBef>
+                <a:spcPts val="200"/>
+              </a:spcBef>
+              <a:spcAft>
+                <a:spcPts val="400"/>
+              </a:spcAft>
+              <a:buClr>
+                <a:schemeClr val="accent1"/>
+              </a:buClr>
+              <a:buFont typeface="Calibri" pitchFamily="34" charset="0"/>
+              <a:buChar char="◦"/>
+              <a:defRPr sz="1400" kern="1200">
+                <a:solidFill>
+                  <a:schemeClr val="tx1">
+                    <a:lumMod val="75000"/>
+                    <a:lumOff val="25000"/>
+                  </a:schemeClr>
+                </a:solidFill>
+                <a:latin typeface="+mn-lt"/>
+                <a:ea typeface="+mn-ea"/>
+                <a:cs typeface="+mn-cs"/>
+              </a:defRPr>
+            </a:lvl5pPr>
+            <a:lvl6pPr marL="1100000" indent="-228600" algn="l" defTabSz="914400" rtl="0" eaLnBrk="1" latinLnBrk="0" hangingPunct="1">
+              <a:lnSpc>
+                <a:spcPct val="90000"/>
+              </a:lnSpc>
+              <a:spcBef>
+                <a:spcPts val="200"/>
+              </a:spcBef>
+              <a:spcAft>
+                <a:spcPts val="400"/>
+              </a:spcAft>
+              <a:buClr>
+                <a:schemeClr val="accent1"/>
+              </a:buClr>
+              <a:buFont typeface="Calibri" pitchFamily="34" charset="0"/>
+              <a:buChar char="◦"/>
+              <a:defRPr sz="1400" kern="1200">
+                <a:solidFill>
+                  <a:schemeClr val="tx1">
+                    <a:lumMod val="75000"/>
+                    <a:lumOff val="25000"/>
+                  </a:schemeClr>
+                </a:solidFill>
+                <a:latin typeface="+mn-lt"/>
+                <a:ea typeface="+mn-ea"/>
+                <a:cs typeface="+mn-cs"/>
+              </a:defRPr>
+            </a:lvl6pPr>
+            <a:lvl7pPr marL="1300000" indent="-228600" algn="l" defTabSz="914400" rtl="0" eaLnBrk="1" latinLnBrk="0" hangingPunct="1">
+              <a:lnSpc>
+                <a:spcPct val="90000"/>
+              </a:lnSpc>
+              <a:spcBef>
+                <a:spcPts val="200"/>
+              </a:spcBef>
+              <a:spcAft>
+                <a:spcPts val="400"/>
+              </a:spcAft>
+              <a:buClr>
+                <a:schemeClr val="accent1"/>
+              </a:buClr>
+              <a:buFont typeface="Calibri" pitchFamily="34" charset="0"/>
+              <a:buChar char="◦"/>
+              <a:defRPr sz="1400" kern="1200">
+                <a:solidFill>
+                  <a:schemeClr val="tx1">
+                    <a:lumMod val="75000"/>
+                    <a:lumOff val="25000"/>
+                  </a:schemeClr>
+                </a:solidFill>
+                <a:latin typeface="+mn-lt"/>
+                <a:ea typeface="+mn-ea"/>
+                <a:cs typeface="+mn-cs"/>
+              </a:defRPr>
+            </a:lvl7pPr>
+            <a:lvl8pPr marL="1500000" indent="-228600" algn="l" defTabSz="914400" rtl="0" eaLnBrk="1" latinLnBrk="0" hangingPunct="1">
+              <a:lnSpc>
+                <a:spcPct val="90000"/>
+              </a:lnSpc>
+              <a:spcBef>
+                <a:spcPts val="200"/>
+              </a:spcBef>
+              <a:spcAft>
+                <a:spcPts val="400"/>
+              </a:spcAft>
+              <a:buClr>
+                <a:schemeClr val="accent1"/>
+              </a:buClr>
+              <a:buFont typeface="Calibri" pitchFamily="34" charset="0"/>
+              <a:buChar char="◦"/>
+              <a:defRPr sz="1400" kern="1200">
+                <a:solidFill>
+                  <a:schemeClr val="tx1">
+                    <a:lumMod val="75000"/>
+                    <a:lumOff val="25000"/>
+                  </a:schemeClr>
+                </a:solidFill>
+                <a:latin typeface="+mn-lt"/>
+                <a:ea typeface="+mn-ea"/>
+                <a:cs typeface="+mn-cs"/>
+              </a:defRPr>
+            </a:lvl8pPr>
+            <a:lvl9pPr marL="1700000" indent="-228600" algn="l" defTabSz="914400" rtl="0" eaLnBrk="1" latinLnBrk="0" hangingPunct="1">
+              <a:lnSpc>
+                <a:spcPct val="90000"/>
+              </a:lnSpc>
+              <a:spcBef>
+                <a:spcPts val="200"/>
+              </a:spcBef>
+              <a:spcAft>
+                <a:spcPts val="400"/>
+              </a:spcAft>
+              <a:buClr>
+                <a:schemeClr val="accent1"/>
+              </a:buClr>
+              <a:buFont typeface="Calibri" pitchFamily="34" charset="0"/>
+              <a:buChar char="◦"/>
+              <a:defRPr sz="1400" kern="1200">
+                <a:solidFill>
+                  <a:schemeClr val="tx1">
+                    <a:lumMod val="75000"/>
+                    <a:lumOff val="25000"/>
+                  </a:schemeClr>
+                </a:solidFill>
+                <a:latin typeface="+mn-lt"/>
+                <a:ea typeface="+mn-ea"/>
+                <a:cs typeface="+mn-cs"/>
+              </a:defRPr>
+            </a:lvl9pPr>
+          </a:lstStyle>
+          <a:p>
+            <a:pPr marL="205740" indent="-228600">
+              <a:buFont typeface="Calibri" panose="020F0502020204030204" pitchFamily="34" charset="0"/>
+              <a:buChar char="•"/>
+            </a:pPr>
+            <a:r>
+              <a:rPr lang="pt-PT" dirty="0" err="1">
+                <a:latin typeface="Helvetica" panose="020B0604020202020204" pitchFamily="34" charset="0"/>
+                <a:cs typeface="Helvetica" panose="020B0604020202020204" pitchFamily="34" charset="0"/>
+              </a:rPr>
+              <a:t>Conclusion</a:t>
+            </a:r>
+            <a:r>
+              <a:rPr lang="pt-PT" dirty="0">
+                <a:latin typeface="Helvetica" panose="020B0604020202020204" pitchFamily="34" charset="0"/>
+                <a:cs typeface="Helvetica" panose="020B0604020202020204" pitchFamily="34" charset="0"/>
+              </a:rPr>
+              <a:t> </a:t>
+            </a:r>
+            <a:r>
+              <a:rPr lang="pt-PT" dirty="0" err="1">
+                <a:latin typeface="Helvetica" panose="020B0604020202020204" pitchFamily="34" charset="0"/>
+                <a:cs typeface="Helvetica" panose="020B0604020202020204" pitchFamily="34" charset="0"/>
+              </a:rPr>
+              <a:t>and</a:t>
+            </a:r>
+            <a:r>
+              <a:rPr lang="pt-PT" dirty="0">
+                <a:latin typeface="Helvetica" panose="020B0604020202020204" pitchFamily="34" charset="0"/>
+                <a:cs typeface="Helvetica" panose="020B0604020202020204" pitchFamily="34" charset="0"/>
+              </a:rPr>
+              <a:t> future </a:t>
+            </a:r>
+            <a:r>
+              <a:rPr lang="pt-PT" dirty="0" err="1">
+                <a:latin typeface="Helvetica" panose="020B0604020202020204" pitchFamily="34" charset="0"/>
+                <a:cs typeface="Helvetica" panose="020B0604020202020204" pitchFamily="34" charset="0"/>
+              </a:rPr>
+              <a:t>work</a:t>
+            </a:r>
+            <a:endParaRPr lang="pt-PT" dirty="0">
+              <a:latin typeface="Helvetica" panose="020B0604020202020204" pitchFamily="34" charset="0"/>
+              <a:cs typeface="Helvetica" panose="020B0604020202020204" pitchFamily="34" charset="0"/>
+            </a:endParaRPr>
+          </a:p>
+          <a:p>
+            <a:pPr lvl="1"/>
+            <a:endParaRPr lang="pt-PT" dirty="0">
+              <a:latin typeface="Helvetica" panose="020B0604020202020204" pitchFamily="34" charset="0"/>
+              <a:cs typeface="Helvetica" panose="020B0604020202020204" pitchFamily="34" charset="0"/>
+            </a:endParaRPr>
+          </a:p>
+        </p:txBody>
+      </p:sp>
     </p:spTree>
     <p:extLst>
       <p:ext uri="{BB962C8B-B14F-4D97-AF65-F5344CB8AC3E}">
@@ -5089,6 +5937,506 @@
   <p:clrMapOvr>
     <a:masterClrMapping/>
   </p:clrMapOvr>
+  <p:timing>
+    <p:tnLst>
+      <p:par>
+        <p:cTn id="1" dur="indefinite" restart="never" nodeType="tmRoot">
+          <p:childTnLst>
+            <p:seq concurrent="1" nextAc="seek">
+              <p:cTn id="2" dur="indefinite" nodeType="mainSeq">
+                <p:childTnLst>
+                  <p:par>
+                    <p:cTn id="3" fill="hold">
+                      <p:stCondLst>
+                        <p:cond delay="indefinite"/>
+                        <p:cond evt="onBegin" delay="0">
+                          <p:tn val="2"/>
+                        </p:cond>
+                      </p:stCondLst>
+                      <p:childTnLst>
+                        <p:par>
+                          <p:cTn id="4" fill="hold">
+                            <p:stCondLst>
+                              <p:cond delay="0"/>
+                            </p:stCondLst>
+                            <p:childTnLst>
+                              <p:par>
+                                <p:cTn id="5" presetID="2" presetClass="entr" presetSubtype="2" fill="hold" grpId="0" nodeType="withEffect">
+                                  <p:stCondLst>
+                                    <p:cond delay="0"/>
+                                  </p:stCondLst>
+                                  <p:childTnLst>
+                                    <p:set>
+                                      <p:cBhvr>
+                                        <p:cTn id="6" dur="1" fill="hold">
+                                          <p:stCondLst>
+                                            <p:cond delay="0"/>
+                                          </p:stCondLst>
+                                        </p:cTn>
+                                        <p:tgtEl>
+                                          <p:spTgt spid="4">
+                                            <p:txEl>
+                                              <p:pRg st="0" end="0"/>
+                                            </p:txEl>
+                                          </p:spTgt>
+                                        </p:tgtEl>
+                                        <p:attrNameLst>
+                                          <p:attrName>style.visibility</p:attrName>
+                                        </p:attrNameLst>
+                                      </p:cBhvr>
+                                      <p:to>
+                                        <p:strVal val="visible"/>
+                                      </p:to>
+                                    </p:set>
+                                    <p:anim calcmode="lin" valueType="num">
+                                      <p:cBhvr additive="base">
+                                        <p:cTn id="7" dur="500" fill="hold"/>
+                                        <p:tgtEl>
+                                          <p:spTgt spid="4">
+                                            <p:txEl>
+                                              <p:pRg st="0" end="0"/>
+                                            </p:txEl>
+                                          </p:spTgt>
+                                        </p:tgtEl>
+                                        <p:attrNameLst>
+                                          <p:attrName>ppt_x</p:attrName>
+                                        </p:attrNameLst>
+                                      </p:cBhvr>
+                                      <p:tavLst>
+                                        <p:tav tm="0">
+                                          <p:val>
+                                            <p:strVal val="1+#ppt_w/2"/>
+                                          </p:val>
+                                        </p:tav>
+                                        <p:tav tm="100000">
+                                          <p:val>
+                                            <p:strVal val="#ppt_x"/>
+                                          </p:val>
+                                        </p:tav>
+                                      </p:tavLst>
+                                    </p:anim>
+                                    <p:anim calcmode="lin" valueType="num">
+                                      <p:cBhvr additive="base">
+                                        <p:cTn id="8" dur="500" fill="hold"/>
+                                        <p:tgtEl>
+                                          <p:spTgt spid="4">
+                                            <p:txEl>
+                                              <p:pRg st="0" end="0"/>
+                                            </p:txEl>
+                                          </p:spTgt>
+                                        </p:tgtEl>
+                                        <p:attrNameLst>
+                                          <p:attrName>ppt_y</p:attrName>
+                                        </p:attrNameLst>
+                                      </p:cBhvr>
+                                      <p:tavLst>
+                                        <p:tav tm="0">
+                                          <p:val>
+                                            <p:strVal val="#ppt_y"/>
+                                          </p:val>
+                                        </p:tav>
+                                        <p:tav tm="100000">
+                                          <p:val>
+                                            <p:strVal val="#ppt_y"/>
+                                          </p:val>
+                                        </p:tav>
+                                      </p:tavLst>
+                                    </p:anim>
+                                  </p:childTnLst>
+                                </p:cTn>
+                              </p:par>
+                              <p:par>
+                                <p:cTn id="9" presetID="2" presetClass="entr" presetSubtype="2" fill="hold" grpId="0" nodeType="withEffect">
+                                  <p:stCondLst>
+                                    <p:cond delay="0"/>
+                                  </p:stCondLst>
+                                  <p:childTnLst>
+                                    <p:set>
+                                      <p:cBhvr>
+                                        <p:cTn id="10" dur="1" fill="hold">
+                                          <p:stCondLst>
+                                            <p:cond delay="0"/>
+                                          </p:stCondLst>
+                                        </p:cTn>
+                                        <p:tgtEl>
+                                          <p:spTgt spid="4">
+                                            <p:txEl>
+                                              <p:pRg st="1" end="1"/>
+                                            </p:txEl>
+                                          </p:spTgt>
+                                        </p:tgtEl>
+                                        <p:attrNameLst>
+                                          <p:attrName>style.visibility</p:attrName>
+                                        </p:attrNameLst>
+                                      </p:cBhvr>
+                                      <p:to>
+                                        <p:strVal val="visible"/>
+                                      </p:to>
+                                    </p:set>
+                                    <p:anim calcmode="lin" valueType="num">
+                                      <p:cBhvr additive="base">
+                                        <p:cTn id="11" dur="500" fill="hold"/>
+                                        <p:tgtEl>
+                                          <p:spTgt spid="4">
+                                            <p:txEl>
+                                              <p:pRg st="1" end="1"/>
+                                            </p:txEl>
+                                          </p:spTgt>
+                                        </p:tgtEl>
+                                        <p:attrNameLst>
+                                          <p:attrName>ppt_x</p:attrName>
+                                        </p:attrNameLst>
+                                      </p:cBhvr>
+                                      <p:tavLst>
+                                        <p:tav tm="0">
+                                          <p:val>
+                                            <p:strVal val="1+#ppt_w/2"/>
+                                          </p:val>
+                                        </p:tav>
+                                        <p:tav tm="100000">
+                                          <p:val>
+                                            <p:strVal val="#ppt_x"/>
+                                          </p:val>
+                                        </p:tav>
+                                      </p:tavLst>
+                                    </p:anim>
+                                    <p:anim calcmode="lin" valueType="num">
+                                      <p:cBhvr additive="base">
+                                        <p:cTn id="12" dur="500" fill="hold"/>
+                                        <p:tgtEl>
+                                          <p:spTgt spid="4">
+                                            <p:txEl>
+                                              <p:pRg st="1" end="1"/>
+                                            </p:txEl>
+                                          </p:spTgt>
+                                        </p:tgtEl>
+                                        <p:attrNameLst>
+                                          <p:attrName>ppt_y</p:attrName>
+                                        </p:attrNameLst>
+                                      </p:cBhvr>
+                                      <p:tavLst>
+                                        <p:tav tm="0">
+                                          <p:val>
+                                            <p:strVal val="#ppt_y"/>
+                                          </p:val>
+                                        </p:tav>
+                                        <p:tav tm="100000">
+                                          <p:val>
+                                            <p:strVal val="#ppt_y"/>
+                                          </p:val>
+                                        </p:tav>
+                                      </p:tavLst>
+                                    </p:anim>
+                                  </p:childTnLst>
+                                </p:cTn>
+                              </p:par>
+                            </p:childTnLst>
+                          </p:cTn>
+                        </p:par>
+                      </p:childTnLst>
+                    </p:cTn>
+                  </p:par>
+                  <p:par>
+                    <p:cTn id="13" fill="hold">
+                      <p:stCondLst>
+                        <p:cond delay="indefinite"/>
+                      </p:stCondLst>
+                      <p:childTnLst>
+                        <p:par>
+                          <p:cTn id="14" fill="hold">
+                            <p:stCondLst>
+                              <p:cond delay="0"/>
+                            </p:stCondLst>
+                            <p:childTnLst>
+                              <p:par>
+                                <p:cTn id="15" presetID="2" presetClass="entr" presetSubtype="2" fill="hold" grpId="0" nodeType="clickEffect">
+                                  <p:stCondLst>
+                                    <p:cond delay="0"/>
+                                  </p:stCondLst>
+                                  <p:childTnLst>
+                                    <p:set>
+                                      <p:cBhvr>
+                                        <p:cTn id="16" dur="1" fill="hold">
+                                          <p:stCondLst>
+                                            <p:cond delay="0"/>
+                                          </p:stCondLst>
+                                        </p:cTn>
+                                        <p:tgtEl>
+                                          <p:spTgt spid="3"/>
+                                        </p:tgtEl>
+                                        <p:attrNameLst>
+                                          <p:attrName>style.visibility</p:attrName>
+                                        </p:attrNameLst>
+                                      </p:cBhvr>
+                                      <p:to>
+                                        <p:strVal val="visible"/>
+                                      </p:to>
+                                    </p:set>
+                                    <p:anim calcmode="lin" valueType="num">
+                                      <p:cBhvr additive="base">
+                                        <p:cTn id="17" dur="500" fill="hold"/>
+                                        <p:tgtEl>
+                                          <p:spTgt spid="3"/>
+                                        </p:tgtEl>
+                                        <p:attrNameLst>
+                                          <p:attrName>ppt_x</p:attrName>
+                                        </p:attrNameLst>
+                                      </p:cBhvr>
+                                      <p:tavLst>
+                                        <p:tav tm="0">
+                                          <p:val>
+                                            <p:strVal val="1+#ppt_w/2"/>
+                                          </p:val>
+                                        </p:tav>
+                                        <p:tav tm="100000">
+                                          <p:val>
+                                            <p:strVal val="#ppt_x"/>
+                                          </p:val>
+                                        </p:tav>
+                                      </p:tavLst>
+                                    </p:anim>
+                                    <p:anim calcmode="lin" valueType="num">
+                                      <p:cBhvr additive="base">
+                                        <p:cTn id="18" dur="500" fill="hold"/>
+                                        <p:tgtEl>
+                                          <p:spTgt spid="3"/>
+                                        </p:tgtEl>
+                                        <p:attrNameLst>
+                                          <p:attrName>ppt_y</p:attrName>
+                                        </p:attrNameLst>
+                                      </p:cBhvr>
+                                      <p:tavLst>
+                                        <p:tav tm="0">
+                                          <p:val>
+                                            <p:strVal val="#ppt_y"/>
+                                          </p:val>
+                                        </p:tav>
+                                        <p:tav tm="100000">
+                                          <p:val>
+                                            <p:strVal val="#ppt_y"/>
+                                          </p:val>
+                                        </p:tav>
+                                      </p:tavLst>
+                                    </p:anim>
+                                  </p:childTnLst>
+                                </p:cTn>
+                              </p:par>
+                            </p:childTnLst>
+                          </p:cTn>
+                        </p:par>
+                      </p:childTnLst>
+                    </p:cTn>
+                  </p:par>
+                  <p:par>
+                    <p:cTn id="19" fill="hold">
+                      <p:stCondLst>
+                        <p:cond delay="indefinite"/>
+                      </p:stCondLst>
+                      <p:childTnLst>
+                        <p:par>
+                          <p:cTn id="20" fill="hold">
+                            <p:stCondLst>
+                              <p:cond delay="0"/>
+                            </p:stCondLst>
+                            <p:childTnLst>
+                              <p:par>
+                                <p:cTn id="21" presetID="2" presetClass="entr" presetSubtype="2" fill="hold" grpId="0" nodeType="clickEffect">
+                                  <p:stCondLst>
+                                    <p:cond delay="0"/>
+                                  </p:stCondLst>
+                                  <p:childTnLst>
+                                    <p:set>
+                                      <p:cBhvr>
+                                        <p:cTn id="22" dur="1" fill="hold">
+                                          <p:stCondLst>
+                                            <p:cond delay="0"/>
+                                          </p:stCondLst>
+                                        </p:cTn>
+                                        <p:tgtEl>
+                                          <p:spTgt spid="5"/>
+                                        </p:tgtEl>
+                                        <p:attrNameLst>
+                                          <p:attrName>style.visibility</p:attrName>
+                                        </p:attrNameLst>
+                                      </p:cBhvr>
+                                      <p:to>
+                                        <p:strVal val="visible"/>
+                                      </p:to>
+                                    </p:set>
+                                    <p:anim calcmode="lin" valueType="num">
+                                      <p:cBhvr additive="base">
+                                        <p:cTn id="23" dur="500" fill="hold"/>
+                                        <p:tgtEl>
+                                          <p:spTgt spid="5"/>
+                                        </p:tgtEl>
+                                        <p:attrNameLst>
+                                          <p:attrName>ppt_x</p:attrName>
+                                        </p:attrNameLst>
+                                      </p:cBhvr>
+                                      <p:tavLst>
+                                        <p:tav tm="0">
+                                          <p:val>
+                                            <p:strVal val="1+#ppt_w/2"/>
+                                          </p:val>
+                                        </p:tav>
+                                        <p:tav tm="100000">
+                                          <p:val>
+                                            <p:strVal val="#ppt_x"/>
+                                          </p:val>
+                                        </p:tav>
+                                      </p:tavLst>
+                                    </p:anim>
+                                    <p:anim calcmode="lin" valueType="num">
+                                      <p:cBhvr additive="base">
+                                        <p:cTn id="24" dur="500" fill="hold"/>
+                                        <p:tgtEl>
+                                          <p:spTgt spid="5"/>
+                                        </p:tgtEl>
+                                        <p:attrNameLst>
+                                          <p:attrName>ppt_y</p:attrName>
+                                        </p:attrNameLst>
+                                      </p:cBhvr>
+                                      <p:tavLst>
+                                        <p:tav tm="0">
+                                          <p:val>
+                                            <p:strVal val="#ppt_y"/>
+                                          </p:val>
+                                        </p:tav>
+                                        <p:tav tm="100000">
+                                          <p:val>
+                                            <p:strVal val="#ppt_y"/>
+                                          </p:val>
+                                        </p:tav>
+                                      </p:tavLst>
+                                    </p:anim>
+                                  </p:childTnLst>
+                                </p:cTn>
+                              </p:par>
+                            </p:childTnLst>
+                          </p:cTn>
+                        </p:par>
+                      </p:childTnLst>
+                    </p:cTn>
+                  </p:par>
+                  <p:par>
+                    <p:cTn id="25" fill="hold">
+                      <p:stCondLst>
+                        <p:cond delay="indefinite"/>
+                      </p:stCondLst>
+                      <p:childTnLst>
+                        <p:par>
+                          <p:cTn id="26" fill="hold">
+                            <p:stCondLst>
+                              <p:cond delay="0"/>
+                            </p:stCondLst>
+                            <p:childTnLst>
+                              <p:par>
+                                <p:cTn id="27" presetID="2" presetClass="entr" presetSubtype="2" fill="hold" grpId="0" nodeType="clickEffect">
+                                  <p:stCondLst>
+                                    <p:cond delay="0"/>
+                                  </p:stCondLst>
+                                  <p:childTnLst>
+                                    <p:set>
+                                      <p:cBhvr>
+                                        <p:cTn id="28" dur="1" fill="hold">
+                                          <p:stCondLst>
+                                            <p:cond delay="0"/>
+                                          </p:stCondLst>
+                                        </p:cTn>
+                                        <p:tgtEl>
+                                          <p:spTgt spid="6"/>
+                                        </p:tgtEl>
+                                        <p:attrNameLst>
+                                          <p:attrName>style.visibility</p:attrName>
+                                        </p:attrNameLst>
+                                      </p:cBhvr>
+                                      <p:to>
+                                        <p:strVal val="visible"/>
+                                      </p:to>
+                                    </p:set>
+                                    <p:anim calcmode="lin" valueType="num">
+                                      <p:cBhvr additive="base">
+                                        <p:cTn id="29" dur="500" fill="hold"/>
+                                        <p:tgtEl>
+                                          <p:spTgt spid="6"/>
+                                        </p:tgtEl>
+                                        <p:attrNameLst>
+                                          <p:attrName>ppt_x</p:attrName>
+                                        </p:attrNameLst>
+                                      </p:cBhvr>
+                                      <p:tavLst>
+                                        <p:tav tm="0">
+                                          <p:val>
+                                            <p:strVal val="1+#ppt_w/2"/>
+                                          </p:val>
+                                        </p:tav>
+                                        <p:tav tm="100000">
+                                          <p:val>
+                                            <p:strVal val="#ppt_x"/>
+                                          </p:val>
+                                        </p:tav>
+                                      </p:tavLst>
+                                    </p:anim>
+                                    <p:anim calcmode="lin" valueType="num">
+                                      <p:cBhvr additive="base">
+                                        <p:cTn id="30" dur="500" fill="hold"/>
+                                        <p:tgtEl>
+                                          <p:spTgt spid="6"/>
+                                        </p:tgtEl>
+                                        <p:attrNameLst>
+                                          <p:attrName>ppt_y</p:attrName>
+                                        </p:attrNameLst>
+                                      </p:cBhvr>
+                                      <p:tavLst>
+                                        <p:tav tm="0">
+                                          <p:val>
+                                            <p:strVal val="#ppt_y"/>
+                                          </p:val>
+                                        </p:tav>
+                                        <p:tav tm="100000">
+                                          <p:val>
+                                            <p:strVal val="#ppt_y"/>
+                                          </p:val>
+                                        </p:tav>
+                                      </p:tavLst>
+                                    </p:anim>
+                                  </p:childTnLst>
+                                </p:cTn>
+                              </p:par>
+                            </p:childTnLst>
+                          </p:cTn>
+                        </p:par>
+                      </p:childTnLst>
+                    </p:cTn>
+                  </p:par>
+                </p:childTnLst>
+              </p:cTn>
+              <p:prevCondLst>
+                <p:cond evt="onPrev" delay="0">
+                  <p:tgtEl>
+                    <p:sldTgt/>
+                  </p:tgtEl>
+                </p:cond>
+              </p:prevCondLst>
+              <p:nextCondLst>
+                <p:cond evt="onNext" delay="0">
+                  <p:tgtEl>
+                    <p:sldTgt/>
+                  </p:tgtEl>
+                </p:cond>
+              </p:nextCondLst>
+            </p:seq>
+          </p:childTnLst>
+        </p:cTn>
+      </p:par>
+    </p:tnLst>
+    <p:bldLst>
+      <p:bldP spid="4" grpId="0" build="p"/>
+      <p:bldP spid="3" grpId="0"/>
+      <p:bldP spid="5" grpId="0"/>
+      <p:bldP spid="6" grpId="0"/>
+    </p:bldLst>
+  </p:timing>
 </p:sld>
 </file>
 
@@ -5195,7 +6543,7 @@
         <p:spPr>
           <a:xfrm>
             <a:off x="1090612" y="1849724"/>
-            <a:ext cx="10515600" cy="4351338"/>
+            <a:ext cx="10515600" cy="750753"/>
           </a:xfrm>
           <a:prstGeom prst="rect">
             <a:avLst/>
@@ -5460,16 +6808,8 @@
                 <a:latin typeface="Helvetica" panose="020B0604020202020204" pitchFamily="34" charset="0"/>
                 <a:cs typeface="Helvetica" panose="020B0604020202020204" pitchFamily="34" charset="0"/>
               </a:rPr>
-              <a:t> 24 features</a:t>
-            </a:r>
-          </a:p>
-          <a:p>
-            <a:pPr lvl="1">
-              <a:buClr>
-                <a:schemeClr val="accent1"/>
-              </a:buClr>
-              <a:buFont typeface="Calibri" panose="020F0502020204030204" pitchFamily="34" charset="0"/>
-            </a:pPr>
+              <a:t> 24 </a:t>
+            </a:r>
             <a:r>
               <a:rPr lang="pt-PT" sz="2000" dirty="0" err="1">
                 <a:solidFill>
@@ -5481,215 +6821,7 @@
                 <a:latin typeface="Helvetica" panose="020B0604020202020204" pitchFamily="34" charset="0"/>
                 <a:cs typeface="Helvetica" panose="020B0604020202020204" pitchFamily="34" charset="0"/>
               </a:rPr>
-              <a:t>Imputation</a:t>
-            </a:r>
-            <a:r>
-              <a:rPr lang="pt-PT" sz="2000" dirty="0">
-                <a:solidFill>
-                  <a:schemeClr val="tx1">
-                    <a:lumMod val="75000"/>
-                    <a:lumOff val="25000"/>
-                  </a:schemeClr>
-                </a:solidFill>
-                <a:latin typeface="Helvetica" panose="020B0604020202020204" pitchFamily="34" charset="0"/>
-                <a:cs typeface="Helvetica" panose="020B0604020202020204" pitchFamily="34" charset="0"/>
-              </a:rPr>
-              <a:t> </a:t>
-            </a:r>
-            <a:r>
-              <a:rPr lang="pt-PT" sz="2000" dirty="0" err="1">
-                <a:solidFill>
-                  <a:schemeClr val="tx1">
-                    <a:lumMod val="75000"/>
-                    <a:lumOff val="25000"/>
-                  </a:schemeClr>
-                </a:solidFill>
-                <a:latin typeface="Helvetica" panose="020B0604020202020204" pitchFamily="34" charset="0"/>
-                <a:cs typeface="Helvetica" panose="020B0604020202020204" pitchFamily="34" charset="0"/>
-              </a:rPr>
-              <a:t>based</a:t>
-            </a:r>
-            <a:r>
-              <a:rPr lang="pt-PT" sz="2000" dirty="0">
-                <a:solidFill>
-                  <a:schemeClr val="tx1">
-                    <a:lumMod val="75000"/>
-                    <a:lumOff val="25000"/>
-                  </a:schemeClr>
-                </a:solidFill>
-                <a:latin typeface="Helvetica" panose="020B0604020202020204" pitchFamily="34" charset="0"/>
-                <a:cs typeface="Helvetica" panose="020B0604020202020204" pitchFamily="34" charset="0"/>
-              </a:rPr>
-              <a:t> </a:t>
-            </a:r>
-            <a:r>
-              <a:rPr lang="pt-PT" sz="2000" dirty="0" err="1">
-                <a:solidFill>
-                  <a:schemeClr val="tx1">
-                    <a:lumMod val="75000"/>
-                    <a:lumOff val="25000"/>
-                  </a:schemeClr>
-                </a:solidFill>
-                <a:latin typeface="Helvetica" panose="020B0604020202020204" pitchFamily="34" charset="0"/>
-                <a:cs typeface="Helvetica" panose="020B0604020202020204" pitchFamily="34" charset="0"/>
-              </a:rPr>
-              <a:t>on</a:t>
-            </a:r>
-            <a:r>
-              <a:rPr lang="pt-PT" sz="2000" dirty="0">
-                <a:solidFill>
-                  <a:schemeClr val="tx1">
-                    <a:lumMod val="75000"/>
-                    <a:lumOff val="25000"/>
-                  </a:schemeClr>
-                </a:solidFill>
-                <a:latin typeface="Helvetica" panose="020B0604020202020204" pitchFamily="34" charset="0"/>
-                <a:cs typeface="Helvetica" panose="020B0604020202020204" pitchFamily="34" charset="0"/>
-              </a:rPr>
-              <a:t> </a:t>
-            </a:r>
-            <a:r>
-              <a:rPr lang="pt-PT" sz="2000" dirty="0" err="1">
-                <a:solidFill>
-                  <a:schemeClr val="tx1">
-                    <a:lumMod val="75000"/>
-                    <a:lumOff val="25000"/>
-                  </a:schemeClr>
-                </a:solidFill>
-                <a:latin typeface="Helvetica" panose="020B0604020202020204" pitchFamily="34" charset="0"/>
-                <a:cs typeface="Helvetica" panose="020B0604020202020204" pitchFamily="34" charset="0"/>
-              </a:rPr>
-              <a:t>median</a:t>
-            </a:r>
-            <a:r>
-              <a:rPr lang="pt-PT" sz="2000" dirty="0">
-                <a:solidFill>
-                  <a:schemeClr val="tx1">
-                    <a:lumMod val="75000"/>
-                    <a:lumOff val="25000"/>
-                  </a:schemeClr>
-                </a:solidFill>
-                <a:latin typeface="Helvetica" panose="020B0604020202020204" pitchFamily="34" charset="0"/>
-                <a:cs typeface="Helvetica" panose="020B0604020202020204" pitchFamily="34" charset="0"/>
-              </a:rPr>
-              <a:t>, mean, </a:t>
-            </a:r>
-            <a:r>
-              <a:rPr lang="pt-PT" sz="2000" dirty="0" err="1">
-                <a:solidFill>
-                  <a:schemeClr val="tx1">
-                    <a:lumMod val="75000"/>
-                    <a:lumOff val="25000"/>
-                  </a:schemeClr>
-                </a:solidFill>
-                <a:latin typeface="Helvetica" panose="020B0604020202020204" pitchFamily="34" charset="0"/>
-                <a:cs typeface="Helvetica" panose="020B0604020202020204" pitchFamily="34" charset="0"/>
-              </a:rPr>
-              <a:t>or</a:t>
-            </a:r>
-            <a:r>
-              <a:rPr lang="pt-PT" sz="2000" dirty="0">
-                <a:solidFill>
-                  <a:schemeClr val="tx1">
-                    <a:lumMod val="75000"/>
-                    <a:lumOff val="25000"/>
-                  </a:schemeClr>
-                </a:solidFill>
-                <a:latin typeface="Helvetica" panose="020B0604020202020204" pitchFamily="34" charset="0"/>
-                <a:cs typeface="Helvetica" panose="020B0604020202020204" pitchFamily="34" charset="0"/>
-              </a:rPr>
-              <a:t> zero, </a:t>
-            </a:r>
-            <a:r>
-              <a:rPr lang="pt-PT" sz="2000" dirty="0" err="1">
-                <a:solidFill>
-                  <a:schemeClr val="tx1">
-                    <a:lumMod val="75000"/>
-                    <a:lumOff val="25000"/>
-                  </a:schemeClr>
-                </a:solidFill>
-                <a:latin typeface="Helvetica" panose="020B0604020202020204" pitchFamily="34" charset="0"/>
-                <a:cs typeface="Helvetica" panose="020B0604020202020204" pitchFamily="34" charset="0"/>
-              </a:rPr>
-              <a:t>given</a:t>
-            </a:r>
-            <a:r>
-              <a:rPr lang="pt-PT" sz="2000" dirty="0">
-                <a:solidFill>
-                  <a:schemeClr val="tx1">
-                    <a:lumMod val="75000"/>
-                    <a:lumOff val="25000"/>
-                  </a:schemeClr>
-                </a:solidFill>
-                <a:latin typeface="Helvetica" panose="020B0604020202020204" pitchFamily="34" charset="0"/>
-                <a:cs typeface="Helvetica" panose="020B0604020202020204" pitchFamily="34" charset="0"/>
-              </a:rPr>
-              <a:t> standard </a:t>
-            </a:r>
-            <a:r>
-              <a:rPr lang="pt-PT" sz="2000" dirty="0" err="1">
-                <a:solidFill>
-                  <a:schemeClr val="tx1">
-                    <a:lumMod val="75000"/>
-                    <a:lumOff val="25000"/>
-                  </a:schemeClr>
-                </a:solidFill>
-                <a:latin typeface="Helvetica" panose="020B0604020202020204" pitchFamily="34" charset="0"/>
-                <a:cs typeface="Helvetica" panose="020B0604020202020204" pitchFamily="34" charset="0"/>
-              </a:rPr>
-              <a:t>deviation</a:t>
-            </a:r>
-            <a:r>
-              <a:rPr lang="pt-PT" sz="2000" dirty="0">
-                <a:solidFill>
-                  <a:schemeClr val="tx1">
-                    <a:lumMod val="75000"/>
-                    <a:lumOff val="25000"/>
-                  </a:schemeClr>
-                </a:solidFill>
-                <a:latin typeface="Helvetica" panose="020B0604020202020204" pitchFamily="34" charset="0"/>
-                <a:cs typeface="Helvetica" panose="020B0604020202020204" pitchFamily="34" charset="0"/>
-              </a:rPr>
-              <a:t> </a:t>
-            </a:r>
-            <a:r>
-              <a:rPr lang="pt-PT" sz="2000" dirty="0" err="1">
-                <a:solidFill>
-                  <a:schemeClr val="tx1">
-                    <a:lumMod val="75000"/>
-                    <a:lumOff val="25000"/>
-                  </a:schemeClr>
-                </a:solidFill>
-                <a:latin typeface="Helvetica" panose="020B0604020202020204" pitchFamily="34" charset="0"/>
-                <a:cs typeface="Helvetica" panose="020B0604020202020204" pitchFamily="34" charset="0"/>
-              </a:rPr>
-              <a:t>of</a:t>
-            </a:r>
-            <a:r>
-              <a:rPr lang="pt-PT" sz="2000" dirty="0">
-                <a:solidFill>
-                  <a:schemeClr val="tx1">
-                    <a:lumMod val="75000"/>
-                    <a:lumOff val="25000"/>
-                  </a:schemeClr>
-                </a:solidFill>
-                <a:latin typeface="Helvetica" panose="020B0604020202020204" pitchFamily="34" charset="0"/>
-                <a:cs typeface="Helvetica" panose="020B0604020202020204" pitchFamily="34" charset="0"/>
-              </a:rPr>
-              <a:t> original </a:t>
-            </a:r>
-            <a:r>
-              <a:rPr lang="pt-PT" sz="2000" dirty="0" err="1">
-                <a:solidFill>
-                  <a:schemeClr val="tx1">
-                    <a:lumMod val="75000"/>
-                    <a:lumOff val="25000"/>
-                  </a:schemeClr>
-                </a:solidFill>
-                <a:latin typeface="Helvetica" panose="020B0604020202020204" pitchFamily="34" charset="0"/>
-                <a:cs typeface="Helvetica" panose="020B0604020202020204" pitchFamily="34" charset="0"/>
-              </a:rPr>
-              <a:t>values</a:t>
+              <a:t>features</a:t>
             </a:r>
             <a:endParaRPr lang="pt-PT" sz="2000" dirty="0">
               <a:solidFill>
@@ -5698,13 +6830,6 @@
                   <a:lumOff val="25000"/>
                 </a:schemeClr>
               </a:solidFill>
-              <a:latin typeface="Helvetica" panose="020B0604020202020204" pitchFamily="34" charset="0"/>
-              <a:cs typeface="Helvetica" panose="020B0604020202020204" pitchFamily="34" charset="0"/>
-            </a:endParaRPr>
-          </a:p>
-          <a:p>
-            <a:pPr lvl="1"/>
-            <a:endParaRPr lang="pt-PT" sz="2000" dirty="0">
               <a:latin typeface="Helvetica" panose="020B0604020202020204" pitchFamily="34" charset="0"/>
               <a:cs typeface="Helvetica" panose="020B0604020202020204" pitchFamily="34" charset="0"/>
             </a:endParaRPr>
@@ -5733,7 +6858,7 @@
         </p:blipFill>
         <p:spPr>
           <a:xfrm>
-            <a:off x="1090612" y="3429000"/>
+            <a:off x="1090612" y="3721966"/>
             <a:ext cx="10010775" cy="1323975"/>
           </a:xfrm>
           <a:prstGeom prst="rect">
@@ -5902,6 +7027,445 @@
           </a:p>
         </p:txBody>
       </p:sp>
+      <p:sp>
+        <p:nvSpPr>
+          <p:cNvPr id="2" name="Marcador de Posição de Conteúdo 5">
+            <a:extLst>
+              <a:ext uri="{FF2B5EF4-FFF2-40B4-BE49-F238E27FC236}">
+                <a16:creationId xmlns:a16="http://schemas.microsoft.com/office/drawing/2014/main" id="{32EDB964-817A-D0C6-8FCE-FF63AC1DB432}"/>
+              </a:ext>
+            </a:extLst>
+          </p:cNvPr>
+          <p:cNvSpPr txBox="1">
+            <a:spLocks/>
+          </p:cNvSpPr>
+          <p:nvPr/>
+        </p:nvSpPr>
+        <p:spPr>
+          <a:xfrm>
+            <a:off x="1090612" y="2578896"/>
+            <a:ext cx="10515600" cy="1323975"/>
+          </a:xfrm>
+          <a:prstGeom prst="rect">
+            <a:avLst/>
+          </a:prstGeom>
+        </p:spPr>
+        <p:txBody>
+          <a:bodyPr vert="horz" lIns="91440" tIns="45720" rIns="91440" bIns="45720" rtlCol="0">
+            <a:normAutofit/>
+          </a:bodyPr>
+          <a:lstStyle>
+            <a:lvl1pPr marL="228600" indent="-228600" algn="l" defTabSz="914400" rtl="0" eaLnBrk="1" latinLnBrk="0" hangingPunct="1">
+              <a:lnSpc>
+                <a:spcPct val="90000"/>
+              </a:lnSpc>
+              <a:spcBef>
+                <a:spcPts val="1000"/>
+              </a:spcBef>
+              <a:buFont typeface="Arial" panose="020B0604020202020204" pitchFamily="34" charset="0"/>
+              <a:buChar char="•"/>
+              <a:defRPr sz="2800" kern="1200">
+                <a:solidFill>
+                  <a:schemeClr val="tx1"/>
+                </a:solidFill>
+                <a:latin typeface="+mn-lt"/>
+                <a:ea typeface="+mn-ea"/>
+                <a:cs typeface="+mn-cs"/>
+              </a:defRPr>
+            </a:lvl1pPr>
+            <a:lvl2pPr marL="685800" indent="-228600" algn="l" defTabSz="914400" rtl="0" eaLnBrk="1" latinLnBrk="0" hangingPunct="1">
+              <a:lnSpc>
+                <a:spcPct val="90000"/>
+              </a:lnSpc>
+              <a:spcBef>
+                <a:spcPts val="500"/>
+              </a:spcBef>
+              <a:buFont typeface="Arial" panose="020B0604020202020204" pitchFamily="34" charset="0"/>
+              <a:buChar char="•"/>
+              <a:defRPr sz="2400" kern="1200">
+                <a:solidFill>
+                  <a:schemeClr val="tx1"/>
+                </a:solidFill>
+                <a:latin typeface="+mn-lt"/>
+                <a:ea typeface="+mn-ea"/>
+                <a:cs typeface="+mn-cs"/>
+              </a:defRPr>
+            </a:lvl2pPr>
+            <a:lvl3pPr marL="1143000" indent="-228600" algn="l" defTabSz="914400" rtl="0" eaLnBrk="1" latinLnBrk="0" hangingPunct="1">
+              <a:lnSpc>
+                <a:spcPct val="90000"/>
+              </a:lnSpc>
+              <a:spcBef>
+                <a:spcPts val="500"/>
+              </a:spcBef>
+              <a:buFont typeface="Arial" panose="020B0604020202020204" pitchFamily="34" charset="0"/>
+              <a:buChar char="•"/>
+              <a:defRPr sz="2000" kern="1200">
+                <a:solidFill>
+                  <a:schemeClr val="tx1"/>
+                </a:solidFill>
+                <a:latin typeface="+mn-lt"/>
+                <a:ea typeface="+mn-ea"/>
+                <a:cs typeface="+mn-cs"/>
+              </a:defRPr>
+            </a:lvl3pPr>
+            <a:lvl4pPr marL="1600200" indent="-228600" algn="l" defTabSz="914400" rtl="0" eaLnBrk="1" latinLnBrk="0" hangingPunct="1">
+              <a:lnSpc>
+                <a:spcPct val="90000"/>
+              </a:lnSpc>
+              <a:spcBef>
+                <a:spcPts val="500"/>
+              </a:spcBef>
+              <a:buFont typeface="Arial" panose="020B0604020202020204" pitchFamily="34" charset="0"/>
+              <a:buChar char="•"/>
+              <a:defRPr sz="1800" kern="1200">
+                <a:solidFill>
+                  <a:schemeClr val="tx1"/>
+                </a:solidFill>
+                <a:latin typeface="+mn-lt"/>
+                <a:ea typeface="+mn-ea"/>
+                <a:cs typeface="+mn-cs"/>
+              </a:defRPr>
+            </a:lvl4pPr>
+            <a:lvl5pPr marL="2057400" indent="-228600" algn="l" defTabSz="914400" rtl="0" eaLnBrk="1" latinLnBrk="0" hangingPunct="1">
+              <a:lnSpc>
+                <a:spcPct val="90000"/>
+              </a:lnSpc>
+              <a:spcBef>
+                <a:spcPts val="500"/>
+              </a:spcBef>
+              <a:buFont typeface="Arial" panose="020B0604020202020204" pitchFamily="34" charset="0"/>
+              <a:buChar char="•"/>
+              <a:defRPr sz="1800" kern="1200">
+                <a:solidFill>
+                  <a:schemeClr val="tx1"/>
+                </a:solidFill>
+                <a:latin typeface="+mn-lt"/>
+                <a:ea typeface="+mn-ea"/>
+                <a:cs typeface="+mn-cs"/>
+              </a:defRPr>
+            </a:lvl5pPr>
+            <a:lvl6pPr marL="2514600" indent="-228600" algn="l" defTabSz="914400" rtl="0" eaLnBrk="1" latinLnBrk="0" hangingPunct="1">
+              <a:lnSpc>
+                <a:spcPct val="90000"/>
+              </a:lnSpc>
+              <a:spcBef>
+                <a:spcPts val="500"/>
+              </a:spcBef>
+              <a:buFont typeface="Arial" panose="020B0604020202020204" pitchFamily="34" charset="0"/>
+              <a:buChar char="•"/>
+              <a:defRPr sz="1800" kern="1200">
+                <a:solidFill>
+                  <a:schemeClr val="tx1"/>
+                </a:solidFill>
+                <a:latin typeface="+mn-lt"/>
+                <a:ea typeface="+mn-ea"/>
+                <a:cs typeface="+mn-cs"/>
+              </a:defRPr>
+            </a:lvl6pPr>
+            <a:lvl7pPr marL="2971800" indent="-228600" algn="l" defTabSz="914400" rtl="0" eaLnBrk="1" latinLnBrk="0" hangingPunct="1">
+              <a:lnSpc>
+                <a:spcPct val="90000"/>
+              </a:lnSpc>
+              <a:spcBef>
+                <a:spcPts val="500"/>
+              </a:spcBef>
+              <a:buFont typeface="Arial" panose="020B0604020202020204" pitchFamily="34" charset="0"/>
+              <a:buChar char="•"/>
+              <a:defRPr sz="1800" kern="1200">
+                <a:solidFill>
+                  <a:schemeClr val="tx1"/>
+                </a:solidFill>
+                <a:latin typeface="+mn-lt"/>
+                <a:ea typeface="+mn-ea"/>
+                <a:cs typeface="+mn-cs"/>
+              </a:defRPr>
+            </a:lvl7pPr>
+            <a:lvl8pPr marL="3429000" indent="-228600" algn="l" defTabSz="914400" rtl="0" eaLnBrk="1" latinLnBrk="0" hangingPunct="1">
+              <a:lnSpc>
+                <a:spcPct val="90000"/>
+              </a:lnSpc>
+              <a:spcBef>
+                <a:spcPts val="500"/>
+              </a:spcBef>
+              <a:buFont typeface="Arial" panose="020B0604020202020204" pitchFamily="34" charset="0"/>
+              <a:buChar char="•"/>
+              <a:defRPr sz="1800" kern="1200">
+                <a:solidFill>
+                  <a:schemeClr val="tx1"/>
+                </a:solidFill>
+                <a:latin typeface="+mn-lt"/>
+                <a:ea typeface="+mn-ea"/>
+                <a:cs typeface="+mn-cs"/>
+              </a:defRPr>
+            </a:lvl8pPr>
+            <a:lvl9pPr marL="3886200" indent="-228600" algn="l" defTabSz="914400" rtl="0" eaLnBrk="1" latinLnBrk="0" hangingPunct="1">
+              <a:lnSpc>
+                <a:spcPct val="90000"/>
+              </a:lnSpc>
+              <a:spcBef>
+                <a:spcPts val="500"/>
+              </a:spcBef>
+              <a:buFont typeface="Arial" panose="020B0604020202020204" pitchFamily="34" charset="0"/>
+              <a:buChar char="•"/>
+              <a:defRPr sz="1800" kern="1200">
+                <a:solidFill>
+                  <a:schemeClr val="tx1"/>
+                </a:solidFill>
+                <a:latin typeface="+mn-lt"/>
+                <a:ea typeface="+mn-ea"/>
+                <a:cs typeface="+mn-cs"/>
+              </a:defRPr>
+            </a:lvl9pPr>
+          </a:lstStyle>
+          <a:p>
+            <a:pPr lvl="1">
+              <a:buClr>
+                <a:schemeClr val="accent1"/>
+              </a:buClr>
+              <a:buFont typeface="Calibri" panose="020F0502020204030204" pitchFamily="34" charset="0"/>
+            </a:pPr>
+            <a:r>
+              <a:rPr lang="pt-PT" sz="2000" dirty="0" err="1">
+                <a:solidFill>
+                  <a:schemeClr val="tx1">
+                    <a:lumMod val="75000"/>
+                    <a:lumOff val="25000"/>
+                  </a:schemeClr>
+                </a:solidFill>
+                <a:latin typeface="Helvetica" panose="020B0604020202020204" pitchFamily="34" charset="0"/>
+                <a:cs typeface="Helvetica" panose="020B0604020202020204" pitchFamily="34" charset="0"/>
+              </a:rPr>
+              <a:t>Imputation</a:t>
+            </a:r>
+            <a:r>
+              <a:rPr lang="pt-PT" sz="2000" dirty="0">
+                <a:solidFill>
+                  <a:schemeClr val="tx1">
+                    <a:lumMod val="75000"/>
+                    <a:lumOff val="25000"/>
+                  </a:schemeClr>
+                </a:solidFill>
+                <a:latin typeface="Helvetica" panose="020B0604020202020204" pitchFamily="34" charset="0"/>
+                <a:cs typeface="Helvetica" panose="020B0604020202020204" pitchFamily="34" charset="0"/>
+              </a:rPr>
+              <a:t> </a:t>
+            </a:r>
+            <a:r>
+              <a:rPr lang="pt-PT" sz="2000" dirty="0" err="1">
+                <a:solidFill>
+                  <a:schemeClr val="tx1">
+                    <a:lumMod val="75000"/>
+                    <a:lumOff val="25000"/>
+                  </a:schemeClr>
+                </a:solidFill>
+                <a:latin typeface="Helvetica" panose="020B0604020202020204" pitchFamily="34" charset="0"/>
+                <a:cs typeface="Helvetica" panose="020B0604020202020204" pitchFamily="34" charset="0"/>
+              </a:rPr>
+              <a:t>based</a:t>
+            </a:r>
+            <a:r>
+              <a:rPr lang="pt-PT" sz="2000" dirty="0">
+                <a:solidFill>
+                  <a:schemeClr val="tx1">
+                    <a:lumMod val="75000"/>
+                    <a:lumOff val="25000"/>
+                  </a:schemeClr>
+                </a:solidFill>
+                <a:latin typeface="Helvetica" panose="020B0604020202020204" pitchFamily="34" charset="0"/>
+                <a:cs typeface="Helvetica" panose="020B0604020202020204" pitchFamily="34" charset="0"/>
+              </a:rPr>
+              <a:t> </a:t>
+            </a:r>
+            <a:r>
+              <a:rPr lang="pt-PT" sz="2000" dirty="0" err="1">
+                <a:solidFill>
+                  <a:schemeClr val="tx1">
+                    <a:lumMod val="75000"/>
+                    <a:lumOff val="25000"/>
+                  </a:schemeClr>
+                </a:solidFill>
+                <a:latin typeface="Helvetica" panose="020B0604020202020204" pitchFamily="34" charset="0"/>
+                <a:cs typeface="Helvetica" panose="020B0604020202020204" pitchFamily="34" charset="0"/>
+              </a:rPr>
+              <a:t>on</a:t>
+            </a:r>
+            <a:r>
+              <a:rPr lang="pt-PT" sz="2000" dirty="0">
+                <a:solidFill>
+                  <a:schemeClr val="tx1">
+                    <a:lumMod val="75000"/>
+                    <a:lumOff val="25000"/>
+                  </a:schemeClr>
+                </a:solidFill>
+                <a:latin typeface="Helvetica" panose="020B0604020202020204" pitchFamily="34" charset="0"/>
+                <a:cs typeface="Helvetica" panose="020B0604020202020204" pitchFamily="34" charset="0"/>
+              </a:rPr>
+              <a:t> </a:t>
+            </a:r>
+            <a:r>
+              <a:rPr lang="pt-PT" sz="2000" dirty="0" err="1">
+                <a:solidFill>
+                  <a:schemeClr val="tx1">
+                    <a:lumMod val="75000"/>
+                    <a:lumOff val="25000"/>
+                  </a:schemeClr>
+                </a:solidFill>
+                <a:latin typeface="Helvetica" panose="020B0604020202020204" pitchFamily="34" charset="0"/>
+                <a:cs typeface="Helvetica" panose="020B0604020202020204" pitchFamily="34" charset="0"/>
+              </a:rPr>
+              <a:t>median</a:t>
+            </a:r>
+            <a:r>
+              <a:rPr lang="pt-PT" sz="2000" dirty="0">
+                <a:solidFill>
+                  <a:schemeClr val="tx1">
+                    <a:lumMod val="75000"/>
+                    <a:lumOff val="25000"/>
+                  </a:schemeClr>
+                </a:solidFill>
+                <a:latin typeface="Helvetica" panose="020B0604020202020204" pitchFamily="34" charset="0"/>
+                <a:cs typeface="Helvetica" panose="020B0604020202020204" pitchFamily="34" charset="0"/>
+              </a:rPr>
+              <a:t>, mean, </a:t>
+            </a:r>
+            <a:r>
+              <a:rPr lang="pt-PT" sz="2000" dirty="0" err="1">
+                <a:solidFill>
+                  <a:schemeClr val="tx1">
+                    <a:lumMod val="75000"/>
+                    <a:lumOff val="25000"/>
+                  </a:schemeClr>
+                </a:solidFill>
+                <a:latin typeface="Helvetica" panose="020B0604020202020204" pitchFamily="34" charset="0"/>
+                <a:cs typeface="Helvetica" panose="020B0604020202020204" pitchFamily="34" charset="0"/>
+              </a:rPr>
+              <a:t>or</a:t>
+            </a:r>
+            <a:r>
+              <a:rPr lang="pt-PT" sz="2000" dirty="0">
+                <a:solidFill>
+                  <a:schemeClr val="tx1">
+                    <a:lumMod val="75000"/>
+                    <a:lumOff val="25000"/>
+                  </a:schemeClr>
+                </a:solidFill>
+                <a:latin typeface="Helvetica" panose="020B0604020202020204" pitchFamily="34" charset="0"/>
+                <a:cs typeface="Helvetica" panose="020B0604020202020204" pitchFamily="34" charset="0"/>
+              </a:rPr>
+              <a:t> zero, </a:t>
+            </a:r>
+            <a:r>
+              <a:rPr lang="pt-PT" sz="2000" dirty="0" err="1">
+                <a:solidFill>
+                  <a:schemeClr val="tx1">
+                    <a:lumMod val="75000"/>
+                    <a:lumOff val="25000"/>
+                  </a:schemeClr>
+                </a:solidFill>
+                <a:latin typeface="Helvetica" panose="020B0604020202020204" pitchFamily="34" charset="0"/>
+                <a:cs typeface="Helvetica" panose="020B0604020202020204" pitchFamily="34" charset="0"/>
+              </a:rPr>
+              <a:t>given</a:t>
+            </a:r>
+            <a:r>
+              <a:rPr lang="pt-PT" sz="2000" dirty="0">
+                <a:solidFill>
+                  <a:schemeClr val="tx1">
+                    <a:lumMod val="75000"/>
+                    <a:lumOff val="25000"/>
+                  </a:schemeClr>
+                </a:solidFill>
+                <a:latin typeface="Helvetica" panose="020B0604020202020204" pitchFamily="34" charset="0"/>
+                <a:cs typeface="Helvetica" panose="020B0604020202020204" pitchFamily="34" charset="0"/>
+              </a:rPr>
+              <a:t> standard </a:t>
+            </a:r>
+            <a:r>
+              <a:rPr lang="pt-PT" sz="2000" dirty="0" err="1">
+                <a:solidFill>
+                  <a:schemeClr val="tx1">
+                    <a:lumMod val="75000"/>
+                    <a:lumOff val="25000"/>
+                  </a:schemeClr>
+                </a:solidFill>
+                <a:latin typeface="Helvetica" panose="020B0604020202020204" pitchFamily="34" charset="0"/>
+                <a:cs typeface="Helvetica" panose="020B0604020202020204" pitchFamily="34" charset="0"/>
+              </a:rPr>
+              <a:t>deviation</a:t>
+            </a:r>
+            <a:r>
+              <a:rPr lang="pt-PT" sz="2000" dirty="0">
+                <a:solidFill>
+                  <a:schemeClr val="tx1">
+                    <a:lumMod val="75000"/>
+                    <a:lumOff val="25000"/>
+                  </a:schemeClr>
+                </a:solidFill>
+                <a:latin typeface="Helvetica" panose="020B0604020202020204" pitchFamily="34" charset="0"/>
+                <a:cs typeface="Helvetica" panose="020B0604020202020204" pitchFamily="34" charset="0"/>
+              </a:rPr>
+              <a:t> </a:t>
+            </a:r>
+            <a:r>
+              <a:rPr lang="pt-PT" sz="2000" dirty="0" err="1">
+                <a:solidFill>
+                  <a:schemeClr val="tx1">
+                    <a:lumMod val="75000"/>
+                    <a:lumOff val="25000"/>
+                  </a:schemeClr>
+                </a:solidFill>
+                <a:latin typeface="Helvetica" panose="020B0604020202020204" pitchFamily="34" charset="0"/>
+                <a:cs typeface="Helvetica" panose="020B0604020202020204" pitchFamily="34" charset="0"/>
+              </a:rPr>
+              <a:t>of</a:t>
+            </a:r>
+            <a:r>
+              <a:rPr lang="pt-PT" sz="2000" dirty="0">
+                <a:solidFill>
+                  <a:schemeClr val="tx1">
+                    <a:lumMod val="75000"/>
+                    <a:lumOff val="25000"/>
+                  </a:schemeClr>
+                </a:solidFill>
+                <a:latin typeface="Helvetica" panose="020B0604020202020204" pitchFamily="34" charset="0"/>
+                <a:cs typeface="Helvetica" panose="020B0604020202020204" pitchFamily="34" charset="0"/>
+              </a:rPr>
+              <a:t> original </a:t>
+            </a:r>
+            <a:r>
+              <a:rPr lang="pt-PT" sz="2000" dirty="0" err="1">
+                <a:solidFill>
+                  <a:schemeClr val="tx1">
+                    <a:lumMod val="75000"/>
+                    <a:lumOff val="25000"/>
+                  </a:schemeClr>
+                </a:solidFill>
+                <a:latin typeface="Helvetica" panose="020B0604020202020204" pitchFamily="34" charset="0"/>
+                <a:cs typeface="Helvetica" panose="020B0604020202020204" pitchFamily="34" charset="0"/>
+              </a:rPr>
+              <a:t>values</a:t>
+            </a:r>
+            <a:endParaRPr lang="pt-PT" sz="2000" dirty="0">
+              <a:solidFill>
+                <a:schemeClr val="tx1">
+                  <a:lumMod val="75000"/>
+                  <a:lumOff val="25000"/>
+                </a:schemeClr>
+              </a:solidFill>
+              <a:latin typeface="Helvetica" panose="020B0604020202020204" pitchFamily="34" charset="0"/>
+              <a:cs typeface="Helvetica" panose="020B0604020202020204" pitchFamily="34" charset="0"/>
+            </a:endParaRPr>
+          </a:p>
+          <a:p>
+            <a:pPr lvl="1"/>
+            <a:endParaRPr lang="pt-PT" sz="2000" dirty="0">
+              <a:latin typeface="Helvetica" panose="020B0604020202020204" pitchFamily="34" charset="0"/>
+              <a:cs typeface="Helvetica" panose="020B0604020202020204" pitchFamily="34" charset="0"/>
+            </a:endParaRPr>
+          </a:p>
+        </p:txBody>
+      </p:sp>
     </p:spTree>
     <p:extLst>
       <p:ext uri="{BB962C8B-B14F-4D97-AF65-F5344CB8AC3E}">
@@ -5912,6 +7476,203 @@
   <p:clrMapOvr>
     <a:masterClrMapping/>
   </p:clrMapOvr>
+  <p:timing>
+    <p:tnLst>
+      <p:par>
+        <p:cTn id="1" dur="indefinite" restart="never" nodeType="tmRoot">
+          <p:childTnLst>
+            <p:seq concurrent="1" nextAc="seek">
+              <p:cTn id="2" dur="indefinite" nodeType="mainSeq">
+                <p:childTnLst>
+                  <p:par>
+                    <p:cTn id="3" fill="hold">
+                      <p:stCondLst>
+                        <p:cond delay="indefinite"/>
+                      </p:stCondLst>
+                      <p:childTnLst>
+                        <p:par>
+                          <p:cTn id="4" fill="hold">
+                            <p:stCondLst>
+                              <p:cond delay="0"/>
+                            </p:stCondLst>
+                            <p:childTnLst>
+                              <p:par>
+                                <p:cTn id="5" presetID="2" presetClass="entr" presetSubtype="4" fill="hold" grpId="0" nodeType="clickEffect">
+                                  <p:stCondLst>
+                                    <p:cond delay="0"/>
+                                  </p:stCondLst>
+                                  <p:childTnLst>
+                                    <p:set>
+                                      <p:cBhvr>
+                                        <p:cTn id="6" dur="1" fill="hold">
+                                          <p:stCondLst>
+                                            <p:cond delay="0"/>
+                                          </p:stCondLst>
+                                        </p:cTn>
+                                        <p:tgtEl>
+                                          <p:spTgt spid="2"/>
+                                        </p:tgtEl>
+                                        <p:attrNameLst>
+                                          <p:attrName>style.visibility</p:attrName>
+                                        </p:attrNameLst>
+                                      </p:cBhvr>
+                                      <p:to>
+                                        <p:strVal val="visible"/>
+                                      </p:to>
+                                    </p:set>
+                                    <p:anim calcmode="lin" valueType="num">
+                                      <p:cBhvr additive="base">
+                                        <p:cTn id="7" dur="500" fill="hold"/>
+                                        <p:tgtEl>
+                                          <p:spTgt spid="2"/>
+                                        </p:tgtEl>
+                                        <p:attrNameLst>
+                                          <p:attrName>ppt_x</p:attrName>
+                                        </p:attrNameLst>
+                                      </p:cBhvr>
+                                      <p:tavLst>
+                                        <p:tav tm="0">
+                                          <p:val>
+                                            <p:strVal val="#ppt_x"/>
+                                          </p:val>
+                                        </p:tav>
+                                        <p:tav tm="100000">
+                                          <p:val>
+                                            <p:strVal val="#ppt_x"/>
+                                          </p:val>
+                                        </p:tav>
+                                      </p:tavLst>
+                                    </p:anim>
+                                    <p:anim calcmode="lin" valueType="num">
+                                      <p:cBhvr additive="base">
+                                        <p:cTn id="8" dur="500" fill="hold"/>
+                                        <p:tgtEl>
+                                          <p:spTgt spid="2"/>
+                                        </p:tgtEl>
+                                        <p:attrNameLst>
+                                          <p:attrName>ppt_y</p:attrName>
+                                        </p:attrNameLst>
+                                      </p:cBhvr>
+                                      <p:tavLst>
+                                        <p:tav tm="0">
+                                          <p:val>
+                                            <p:strVal val="1+#ppt_h/2"/>
+                                          </p:val>
+                                        </p:tav>
+                                        <p:tav tm="100000">
+                                          <p:val>
+                                            <p:strVal val="#ppt_y"/>
+                                          </p:val>
+                                        </p:tav>
+                                      </p:tavLst>
+                                    </p:anim>
+                                  </p:childTnLst>
+                                </p:cTn>
+                              </p:par>
+                              <p:par>
+                                <p:cTn id="9" presetID="2" presetClass="entr" presetSubtype="4" fill="hold" nodeType="withEffect">
+                                  <p:stCondLst>
+                                    <p:cond delay="0"/>
+                                  </p:stCondLst>
+                                  <p:childTnLst>
+                                    <p:set>
+                                      <p:cBhvr>
+                                        <p:cTn id="10" dur="1" fill="hold">
+                                          <p:stCondLst>
+                                            <p:cond delay="0"/>
+                                          </p:stCondLst>
+                                        </p:cTn>
+                                        <p:tgtEl>
+                                          <p:spTgt spid="11"/>
+                                        </p:tgtEl>
+                                        <p:attrNameLst>
+                                          <p:attrName>style.visibility</p:attrName>
+                                        </p:attrNameLst>
+                                      </p:cBhvr>
+                                      <p:to>
+                                        <p:strVal val="visible"/>
+                                      </p:to>
+                                    </p:set>
+                                    <p:anim calcmode="lin" valueType="num">
+                                      <p:cBhvr additive="base">
+                                        <p:cTn id="11" dur="500" fill="hold"/>
+                                        <p:tgtEl>
+                                          <p:spTgt spid="11"/>
+                                        </p:tgtEl>
+                                        <p:attrNameLst>
+                                          <p:attrName>ppt_x</p:attrName>
+                                        </p:attrNameLst>
+                                      </p:cBhvr>
+                                      <p:tavLst>
+                                        <p:tav tm="0">
+                                          <p:val>
+                                            <p:strVal val="#ppt_x"/>
+                                          </p:val>
+                                        </p:tav>
+                                        <p:tav tm="100000">
+                                          <p:val>
+                                            <p:strVal val="#ppt_x"/>
+                                          </p:val>
+                                        </p:tav>
+                                      </p:tavLst>
+                                    </p:anim>
+                                    <p:anim calcmode="lin" valueType="num">
+                                      <p:cBhvr additive="base">
+                                        <p:cTn id="12" dur="500" fill="hold"/>
+                                        <p:tgtEl>
+                                          <p:spTgt spid="11"/>
+                                        </p:tgtEl>
+                                        <p:attrNameLst>
+                                          <p:attrName>ppt_y</p:attrName>
+                                        </p:attrNameLst>
+                                      </p:cBhvr>
+                                      <p:tavLst>
+                                        <p:tav tm="0">
+                                          <p:val>
+                                            <p:strVal val="1+#ppt_h/2"/>
+                                          </p:val>
+                                        </p:tav>
+                                        <p:tav tm="100000">
+                                          <p:val>
+                                            <p:strVal val="#ppt_y"/>
+                                          </p:val>
+                                        </p:tav>
+                                      </p:tavLst>
+                                    </p:anim>
+                                  </p:childTnLst>
+                                </p:cTn>
+                              </p:par>
+                            </p:childTnLst>
+                          </p:cTn>
+                        </p:par>
+                      </p:childTnLst>
+                    </p:cTn>
+                  </p:par>
+                </p:childTnLst>
+              </p:cTn>
+              <p:prevCondLst>
+                <p:cond evt="onPrev" delay="0">
+                  <p:tgtEl>
+                    <p:sldTgt/>
+                  </p:tgtEl>
+                </p:cond>
+              </p:prevCondLst>
+              <p:nextCondLst>
+                <p:cond evt="onNext" delay="0">
+                  <p:tgtEl>
+                    <p:sldTgt/>
+                  </p:tgtEl>
+                </p:cond>
+              </p:nextCondLst>
+            </p:seq>
+          </p:childTnLst>
+        </p:cTn>
+      </p:par>
+    </p:tnLst>
+    <p:bldLst>
+      <p:bldP spid="2" grpId="0"/>
+    </p:bldLst>
+  </p:timing>
 </p:sld>
 </file>
 
@@ -5951,7 +7712,7 @@
         <p:spPr>
           <a:xfrm>
             <a:off x="1197130" y="1753487"/>
-            <a:ext cx="10515600" cy="4351338"/>
+            <a:ext cx="10515600" cy="1149511"/>
           </a:xfrm>
         </p:spPr>
         <p:txBody>
@@ -6182,8 +7943,8 @@
         </p:blipFill>
         <p:spPr>
           <a:xfrm>
-            <a:off x="2127163" y="2825824"/>
-            <a:ext cx="7937674" cy="3601351"/>
+            <a:off x="1146295" y="1763127"/>
+            <a:ext cx="10066188" cy="4567066"/>
           </a:xfrm>
           <a:prstGeom prst="rect">
             <a:avLst/>
@@ -6348,6 +8109,406 @@
   <p:clrMapOvr>
     <a:masterClrMapping/>
   </p:clrMapOvr>
+  <p:timing>
+    <p:tnLst>
+      <p:par>
+        <p:cTn id="1" dur="indefinite" restart="never" nodeType="tmRoot">
+          <p:childTnLst>
+            <p:seq concurrent="1" nextAc="seek">
+              <p:cTn id="2" dur="indefinite" nodeType="mainSeq">
+                <p:childTnLst>
+                  <p:par>
+                    <p:cTn id="3" fill="hold">
+                      <p:stCondLst>
+                        <p:cond delay="indefinite"/>
+                        <p:cond evt="onBegin" delay="0">
+                          <p:tn val="2"/>
+                        </p:cond>
+                      </p:stCondLst>
+                      <p:childTnLst>
+                        <p:par>
+                          <p:cTn id="4" fill="hold">
+                            <p:stCondLst>
+                              <p:cond delay="0"/>
+                            </p:stCondLst>
+                            <p:childTnLst>
+                              <p:par>
+                                <p:cTn id="5" presetID="2" presetClass="entr" presetSubtype="2" fill="hold" grpId="0" nodeType="withEffect">
+                                  <p:stCondLst>
+                                    <p:cond delay="0"/>
+                                  </p:stCondLst>
+                                  <p:childTnLst>
+                                    <p:set>
+                                      <p:cBhvr>
+                                        <p:cTn id="6" dur="1" fill="hold">
+                                          <p:stCondLst>
+                                            <p:cond delay="0"/>
+                                          </p:stCondLst>
+                                        </p:cTn>
+                                        <p:tgtEl>
+                                          <p:spTgt spid="10">
+                                            <p:txEl>
+                                              <p:pRg st="0" end="0"/>
+                                            </p:txEl>
+                                          </p:spTgt>
+                                        </p:tgtEl>
+                                        <p:attrNameLst>
+                                          <p:attrName>style.visibility</p:attrName>
+                                        </p:attrNameLst>
+                                      </p:cBhvr>
+                                      <p:to>
+                                        <p:strVal val="visible"/>
+                                      </p:to>
+                                    </p:set>
+                                    <p:anim calcmode="lin" valueType="num">
+                                      <p:cBhvr additive="base">
+                                        <p:cTn id="7" dur="500" fill="hold"/>
+                                        <p:tgtEl>
+                                          <p:spTgt spid="10">
+                                            <p:txEl>
+                                              <p:pRg st="0" end="0"/>
+                                            </p:txEl>
+                                          </p:spTgt>
+                                        </p:tgtEl>
+                                        <p:attrNameLst>
+                                          <p:attrName>ppt_x</p:attrName>
+                                        </p:attrNameLst>
+                                      </p:cBhvr>
+                                      <p:tavLst>
+                                        <p:tav tm="0">
+                                          <p:val>
+                                            <p:strVal val="1+#ppt_w/2"/>
+                                          </p:val>
+                                        </p:tav>
+                                        <p:tav tm="100000">
+                                          <p:val>
+                                            <p:strVal val="#ppt_x"/>
+                                          </p:val>
+                                        </p:tav>
+                                      </p:tavLst>
+                                    </p:anim>
+                                    <p:anim calcmode="lin" valueType="num">
+                                      <p:cBhvr additive="base">
+                                        <p:cTn id="8" dur="500" fill="hold"/>
+                                        <p:tgtEl>
+                                          <p:spTgt spid="10">
+                                            <p:txEl>
+                                              <p:pRg st="0" end="0"/>
+                                            </p:txEl>
+                                          </p:spTgt>
+                                        </p:tgtEl>
+                                        <p:attrNameLst>
+                                          <p:attrName>ppt_y</p:attrName>
+                                        </p:attrNameLst>
+                                      </p:cBhvr>
+                                      <p:tavLst>
+                                        <p:tav tm="0">
+                                          <p:val>
+                                            <p:strVal val="#ppt_y"/>
+                                          </p:val>
+                                        </p:tav>
+                                        <p:tav tm="100000">
+                                          <p:val>
+                                            <p:strVal val="#ppt_y"/>
+                                          </p:val>
+                                        </p:tav>
+                                      </p:tavLst>
+                                    </p:anim>
+                                  </p:childTnLst>
+                                </p:cTn>
+                              </p:par>
+                              <p:par>
+                                <p:cTn id="9" presetID="2" presetClass="entr" presetSubtype="2" fill="hold" grpId="0" nodeType="withEffect">
+                                  <p:stCondLst>
+                                    <p:cond delay="0"/>
+                                  </p:stCondLst>
+                                  <p:childTnLst>
+                                    <p:set>
+                                      <p:cBhvr>
+                                        <p:cTn id="10" dur="1" fill="hold">
+                                          <p:stCondLst>
+                                            <p:cond delay="0"/>
+                                          </p:stCondLst>
+                                        </p:cTn>
+                                        <p:tgtEl>
+                                          <p:spTgt spid="10">
+                                            <p:txEl>
+                                              <p:pRg st="1" end="1"/>
+                                            </p:txEl>
+                                          </p:spTgt>
+                                        </p:tgtEl>
+                                        <p:attrNameLst>
+                                          <p:attrName>style.visibility</p:attrName>
+                                        </p:attrNameLst>
+                                      </p:cBhvr>
+                                      <p:to>
+                                        <p:strVal val="visible"/>
+                                      </p:to>
+                                    </p:set>
+                                    <p:anim calcmode="lin" valueType="num">
+                                      <p:cBhvr additive="base">
+                                        <p:cTn id="11" dur="500" fill="hold"/>
+                                        <p:tgtEl>
+                                          <p:spTgt spid="10">
+                                            <p:txEl>
+                                              <p:pRg st="1" end="1"/>
+                                            </p:txEl>
+                                          </p:spTgt>
+                                        </p:tgtEl>
+                                        <p:attrNameLst>
+                                          <p:attrName>ppt_x</p:attrName>
+                                        </p:attrNameLst>
+                                      </p:cBhvr>
+                                      <p:tavLst>
+                                        <p:tav tm="0">
+                                          <p:val>
+                                            <p:strVal val="1+#ppt_w/2"/>
+                                          </p:val>
+                                        </p:tav>
+                                        <p:tav tm="100000">
+                                          <p:val>
+                                            <p:strVal val="#ppt_x"/>
+                                          </p:val>
+                                        </p:tav>
+                                      </p:tavLst>
+                                    </p:anim>
+                                    <p:anim calcmode="lin" valueType="num">
+                                      <p:cBhvr additive="base">
+                                        <p:cTn id="12" dur="500" fill="hold"/>
+                                        <p:tgtEl>
+                                          <p:spTgt spid="10">
+                                            <p:txEl>
+                                              <p:pRg st="1" end="1"/>
+                                            </p:txEl>
+                                          </p:spTgt>
+                                        </p:tgtEl>
+                                        <p:attrNameLst>
+                                          <p:attrName>ppt_y</p:attrName>
+                                        </p:attrNameLst>
+                                      </p:cBhvr>
+                                      <p:tavLst>
+                                        <p:tav tm="0">
+                                          <p:val>
+                                            <p:strVal val="#ppt_y"/>
+                                          </p:val>
+                                        </p:tav>
+                                        <p:tav tm="100000">
+                                          <p:val>
+                                            <p:strVal val="#ppt_y"/>
+                                          </p:val>
+                                        </p:tav>
+                                      </p:tavLst>
+                                    </p:anim>
+                                  </p:childTnLst>
+                                </p:cTn>
+                              </p:par>
+                              <p:par>
+                                <p:cTn id="13" presetID="2" presetClass="entr" presetSubtype="2" fill="hold" grpId="0" nodeType="withEffect">
+                                  <p:stCondLst>
+                                    <p:cond delay="0"/>
+                                  </p:stCondLst>
+                                  <p:childTnLst>
+                                    <p:set>
+                                      <p:cBhvr>
+                                        <p:cTn id="14" dur="1" fill="hold">
+                                          <p:stCondLst>
+                                            <p:cond delay="0"/>
+                                          </p:stCondLst>
+                                        </p:cTn>
+                                        <p:tgtEl>
+                                          <p:spTgt spid="10">
+                                            <p:txEl>
+                                              <p:pRg st="2" end="2"/>
+                                            </p:txEl>
+                                          </p:spTgt>
+                                        </p:tgtEl>
+                                        <p:attrNameLst>
+                                          <p:attrName>style.visibility</p:attrName>
+                                        </p:attrNameLst>
+                                      </p:cBhvr>
+                                      <p:to>
+                                        <p:strVal val="visible"/>
+                                      </p:to>
+                                    </p:set>
+                                    <p:anim calcmode="lin" valueType="num">
+                                      <p:cBhvr additive="base">
+                                        <p:cTn id="15" dur="500" fill="hold"/>
+                                        <p:tgtEl>
+                                          <p:spTgt spid="10">
+                                            <p:txEl>
+                                              <p:pRg st="2" end="2"/>
+                                            </p:txEl>
+                                          </p:spTgt>
+                                        </p:tgtEl>
+                                        <p:attrNameLst>
+                                          <p:attrName>ppt_x</p:attrName>
+                                        </p:attrNameLst>
+                                      </p:cBhvr>
+                                      <p:tavLst>
+                                        <p:tav tm="0">
+                                          <p:val>
+                                            <p:strVal val="1+#ppt_w/2"/>
+                                          </p:val>
+                                        </p:tav>
+                                        <p:tav tm="100000">
+                                          <p:val>
+                                            <p:strVal val="#ppt_x"/>
+                                          </p:val>
+                                        </p:tav>
+                                      </p:tavLst>
+                                    </p:anim>
+                                    <p:anim calcmode="lin" valueType="num">
+                                      <p:cBhvr additive="base">
+                                        <p:cTn id="16" dur="500" fill="hold"/>
+                                        <p:tgtEl>
+                                          <p:spTgt spid="10">
+                                            <p:txEl>
+                                              <p:pRg st="2" end="2"/>
+                                            </p:txEl>
+                                          </p:spTgt>
+                                        </p:tgtEl>
+                                        <p:attrNameLst>
+                                          <p:attrName>ppt_y</p:attrName>
+                                        </p:attrNameLst>
+                                      </p:cBhvr>
+                                      <p:tavLst>
+                                        <p:tav tm="0">
+                                          <p:val>
+                                            <p:strVal val="#ppt_y"/>
+                                          </p:val>
+                                        </p:tav>
+                                        <p:tav tm="100000">
+                                          <p:val>
+                                            <p:strVal val="#ppt_y"/>
+                                          </p:val>
+                                        </p:tav>
+                                      </p:tavLst>
+                                    </p:anim>
+                                  </p:childTnLst>
+                                </p:cTn>
+                              </p:par>
+                            </p:childTnLst>
+                          </p:cTn>
+                        </p:par>
+                      </p:childTnLst>
+                    </p:cTn>
+                  </p:par>
+                  <p:par>
+                    <p:cTn id="17" fill="hold">
+                      <p:stCondLst>
+                        <p:cond delay="indefinite"/>
+                      </p:stCondLst>
+                      <p:childTnLst>
+                        <p:par>
+                          <p:cTn id="18" fill="hold">
+                            <p:stCondLst>
+                              <p:cond delay="0"/>
+                            </p:stCondLst>
+                            <p:childTnLst>
+                              <p:par>
+                                <p:cTn id="19" presetID="2" presetClass="entr" presetSubtype="4" fill="hold" nodeType="clickEffect">
+                                  <p:stCondLst>
+                                    <p:cond delay="0"/>
+                                  </p:stCondLst>
+                                  <p:childTnLst>
+                                    <p:set>
+                                      <p:cBhvr>
+                                        <p:cTn id="20" dur="1" fill="hold">
+                                          <p:stCondLst>
+                                            <p:cond delay="0"/>
+                                          </p:stCondLst>
+                                        </p:cTn>
+                                        <p:tgtEl>
+                                          <p:spTgt spid="4"/>
+                                        </p:tgtEl>
+                                        <p:attrNameLst>
+                                          <p:attrName>style.visibility</p:attrName>
+                                        </p:attrNameLst>
+                                      </p:cBhvr>
+                                      <p:to>
+                                        <p:strVal val="visible"/>
+                                      </p:to>
+                                    </p:set>
+                                    <p:anim calcmode="lin" valueType="num">
+                                      <p:cBhvr additive="base">
+                                        <p:cTn id="21" dur="500" fill="hold"/>
+                                        <p:tgtEl>
+                                          <p:spTgt spid="4"/>
+                                        </p:tgtEl>
+                                        <p:attrNameLst>
+                                          <p:attrName>ppt_x</p:attrName>
+                                        </p:attrNameLst>
+                                      </p:cBhvr>
+                                      <p:tavLst>
+                                        <p:tav tm="0">
+                                          <p:val>
+                                            <p:strVal val="#ppt_x"/>
+                                          </p:val>
+                                        </p:tav>
+                                        <p:tav tm="100000">
+                                          <p:val>
+                                            <p:strVal val="#ppt_x"/>
+                                          </p:val>
+                                        </p:tav>
+                                      </p:tavLst>
+                                    </p:anim>
+                                    <p:anim calcmode="lin" valueType="num">
+                                      <p:cBhvr additive="base">
+                                        <p:cTn id="22" dur="500" fill="hold"/>
+                                        <p:tgtEl>
+                                          <p:spTgt spid="4"/>
+                                        </p:tgtEl>
+                                        <p:attrNameLst>
+                                          <p:attrName>ppt_y</p:attrName>
+                                        </p:attrNameLst>
+                                      </p:cBhvr>
+                                      <p:tavLst>
+                                        <p:tav tm="0">
+                                          <p:val>
+                                            <p:strVal val="1+#ppt_h/2"/>
+                                          </p:val>
+                                        </p:tav>
+                                        <p:tav tm="100000">
+                                          <p:val>
+                                            <p:strVal val="#ppt_y"/>
+                                          </p:val>
+                                        </p:tav>
+                                      </p:tavLst>
+                                    </p:anim>
+                                  </p:childTnLst>
+                                </p:cTn>
+                              </p:par>
+                            </p:childTnLst>
+                          </p:cTn>
+                        </p:par>
+                      </p:childTnLst>
+                    </p:cTn>
+                  </p:par>
+                </p:childTnLst>
+              </p:cTn>
+              <p:prevCondLst>
+                <p:cond evt="onPrev" delay="0">
+                  <p:tgtEl>
+                    <p:sldTgt/>
+                  </p:tgtEl>
+                </p:cond>
+              </p:prevCondLst>
+              <p:nextCondLst>
+                <p:cond evt="onNext" delay="0">
+                  <p:tgtEl>
+                    <p:sldTgt/>
+                  </p:tgtEl>
+                </p:cond>
+              </p:nextCondLst>
+            </p:seq>
+          </p:childTnLst>
+        </p:cTn>
+      </p:par>
+    </p:tnLst>
+    <p:bldLst>
+      <p:bldP spid="10" grpId="0" build="p"/>
+    </p:bldLst>
+  </p:timing>
 </p:sld>
 </file>
 

</xml_diff>